<commit_message>
Update Exposición ISO-IEC 29110.pptx
se modifico la diaposotivas
</commit_message>
<xml_diff>
--- a/Documentos de ponencias en eventos y exposiciones/Presentación de la ISO-IEC 29110 a los nuevos integrantes/Exposición ISO-IEC 29110.pptx
+++ b/Documentos de ponencias en eventos y exposiciones/Presentación de la ISO-IEC 29110 a los nuevos integrantes/Exposición ISO-IEC 29110.pptx
@@ -5,7 +5,7 @@
     <p:sldMasterId id="2147483660" r:id="rId1"/>
   </p:sldMasterIdLst>
   <p:notesMasterIdLst>
-    <p:notesMasterId r:id="rId14"/>
+    <p:notesMasterId r:id="rId18"/>
   </p:notesMasterIdLst>
   <p:sldIdLst>
     <p:sldId id="256" r:id="rId2"/>
@@ -17,9 +17,13 @@
     <p:sldId id="310" r:id="rId8"/>
     <p:sldId id="331" r:id="rId9"/>
     <p:sldId id="330" r:id="rId10"/>
-    <p:sldId id="317" r:id="rId11"/>
-    <p:sldId id="318" r:id="rId12"/>
-    <p:sldId id="297" r:id="rId13"/>
+    <p:sldId id="333" r:id="rId11"/>
+    <p:sldId id="334" r:id="rId12"/>
+    <p:sldId id="335" r:id="rId13"/>
+    <p:sldId id="332" r:id="rId14"/>
+    <p:sldId id="317" r:id="rId15"/>
+    <p:sldId id="318" r:id="rId16"/>
+    <p:sldId id="297" r:id="rId17"/>
   </p:sldIdLst>
   <p:sldSz cx="9144000" cy="6858000" type="screen4x3"/>
   <p:notesSz cx="6858000" cy="9144000"/>
@@ -1501,6 +1505,13 @@
         </dgm:presLayoutVars>
       </dgm:prSet>
       <dgm:spPr/>
+      <dgm:t>
+        <a:bodyPr/>
+        <a:lstStyle/>
+        <a:p>
+          <a:endParaRPr lang="es-ES"/>
+        </a:p>
+      </dgm:t>
     </dgm:pt>
     <dgm:pt modelId="{02BE49C7-665B-4C3D-A106-CA427F48BCAF}" type="pres">
       <dgm:prSet presAssocID="{D47754FE-3154-4F9F-9E2B-4221CEEAA210}" presName="composite" presStyleCnt="0"/>
@@ -1515,10 +1526,24 @@
         </dgm:presLayoutVars>
       </dgm:prSet>
       <dgm:spPr/>
+      <dgm:t>
+        <a:bodyPr/>
+        <a:lstStyle/>
+        <a:p>
+          <a:endParaRPr lang="es-ES"/>
+        </a:p>
+      </dgm:t>
     </dgm:pt>
     <dgm:pt modelId="{5BB44648-10DE-43B4-B115-41EF1A186346}" type="pres">
       <dgm:prSet presAssocID="{D47754FE-3154-4F9F-9E2B-4221CEEAA210}" presName="parSh" presStyleLbl="node1" presStyleIdx="0" presStyleCnt="4"/>
       <dgm:spPr/>
+      <dgm:t>
+        <a:bodyPr/>
+        <a:lstStyle/>
+        <a:p>
+          <a:endParaRPr lang="es-ES"/>
+        </a:p>
+      </dgm:t>
     </dgm:pt>
     <dgm:pt modelId="{D02E87F5-91E0-4C1F-A5B8-0BA8CF87E582}" type="pres">
       <dgm:prSet presAssocID="{D47754FE-3154-4F9F-9E2B-4221CEEAA210}" presName="desTx" presStyleLbl="fgAcc1" presStyleIdx="0" presStyleCnt="4" custScaleX="110838">
@@ -1527,14 +1552,35 @@
         </dgm:presLayoutVars>
       </dgm:prSet>
       <dgm:spPr/>
+      <dgm:t>
+        <a:bodyPr/>
+        <a:lstStyle/>
+        <a:p>
+          <a:endParaRPr lang="es-ES"/>
+        </a:p>
+      </dgm:t>
     </dgm:pt>
     <dgm:pt modelId="{88E2B1E4-04B5-41FA-A12F-BE67D51B6C5F}" type="pres">
       <dgm:prSet presAssocID="{123588F0-CE72-4B1F-8B84-5553302DB827}" presName="sibTrans" presStyleLbl="sibTrans2D1" presStyleIdx="0" presStyleCnt="3"/>
       <dgm:spPr/>
+      <dgm:t>
+        <a:bodyPr/>
+        <a:lstStyle/>
+        <a:p>
+          <a:endParaRPr lang="es-ES"/>
+        </a:p>
+      </dgm:t>
     </dgm:pt>
     <dgm:pt modelId="{62DBB75B-493D-4ED1-8514-A72E66E97119}" type="pres">
       <dgm:prSet presAssocID="{123588F0-CE72-4B1F-8B84-5553302DB827}" presName="connTx" presStyleLbl="sibTrans2D1" presStyleIdx="0" presStyleCnt="3"/>
       <dgm:spPr/>
+      <dgm:t>
+        <a:bodyPr/>
+        <a:lstStyle/>
+        <a:p>
+          <a:endParaRPr lang="es-ES"/>
+        </a:p>
+      </dgm:t>
     </dgm:pt>
     <dgm:pt modelId="{5FDCDE92-7A60-430F-9874-09E29F2620A2}" type="pres">
       <dgm:prSet presAssocID="{8E9E8EAE-C51B-43BB-AB85-A07B7A42250B}" presName="composite" presStyleCnt="0"/>
@@ -1549,10 +1595,24 @@
         </dgm:presLayoutVars>
       </dgm:prSet>
       <dgm:spPr/>
+      <dgm:t>
+        <a:bodyPr/>
+        <a:lstStyle/>
+        <a:p>
+          <a:endParaRPr lang="es-ES"/>
+        </a:p>
+      </dgm:t>
     </dgm:pt>
     <dgm:pt modelId="{6E69A30B-E30E-4A4A-903F-9C45B8148E8A}" type="pres">
       <dgm:prSet presAssocID="{8E9E8EAE-C51B-43BB-AB85-A07B7A42250B}" presName="parSh" presStyleLbl="node1" presStyleIdx="1" presStyleCnt="4" custScaleX="106569"/>
       <dgm:spPr/>
+      <dgm:t>
+        <a:bodyPr/>
+        <a:lstStyle/>
+        <a:p>
+          <a:endParaRPr lang="es-ES"/>
+        </a:p>
+      </dgm:t>
     </dgm:pt>
     <dgm:pt modelId="{C6761EF3-66FA-4B14-92BF-D2A06FE81CE9}" type="pres">
       <dgm:prSet presAssocID="{8E9E8EAE-C51B-43BB-AB85-A07B7A42250B}" presName="desTx" presStyleLbl="fgAcc1" presStyleIdx="1" presStyleCnt="4">
@@ -1561,14 +1621,35 @@
         </dgm:presLayoutVars>
       </dgm:prSet>
       <dgm:spPr/>
+      <dgm:t>
+        <a:bodyPr/>
+        <a:lstStyle/>
+        <a:p>
+          <a:endParaRPr lang="es-ES"/>
+        </a:p>
+      </dgm:t>
     </dgm:pt>
     <dgm:pt modelId="{ADF8F87A-B442-4640-849F-83C75E8EF929}" type="pres">
       <dgm:prSet presAssocID="{CDB6FA27-D583-4260-AA26-84D379DFA717}" presName="sibTrans" presStyleLbl="sibTrans2D1" presStyleIdx="1" presStyleCnt="3"/>
       <dgm:spPr/>
+      <dgm:t>
+        <a:bodyPr/>
+        <a:lstStyle/>
+        <a:p>
+          <a:endParaRPr lang="es-ES"/>
+        </a:p>
+      </dgm:t>
     </dgm:pt>
     <dgm:pt modelId="{9AF69F07-8AE2-40C2-A400-56FDAB4ACE6A}" type="pres">
       <dgm:prSet presAssocID="{CDB6FA27-D583-4260-AA26-84D379DFA717}" presName="connTx" presStyleLbl="sibTrans2D1" presStyleIdx="1" presStyleCnt="3"/>
       <dgm:spPr/>
+      <dgm:t>
+        <a:bodyPr/>
+        <a:lstStyle/>
+        <a:p>
+          <a:endParaRPr lang="es-ES"/>
+        </a:p>
+      </dgm:t>
     </dgm:pt>
     <dgm:pt modelId="{26FC784F-DB2F-4DDB-8802-5B39D0D36D91}" type="pres">
       <dgm:prSet presAssocID="{B4DF41A4-27CF-4137-A10B-EE6AFE441123}" presName="composite" presStyleCnt="0"/>
@@ -1583,10 +1664,24 @@
         </dgm:presLayoutVars>
       </dgm:prSet>
       <dgm:spPr/>
+      <dgm:t>
+        <a:bodyPr/>
+        <a:lstStyle/>
+        <a:p>
+          <a:endParaRPr lang="es-ES"/>
+        </a:p>
+      </dgm:t>
     </dgm:pt>
     <dgm:pt modelId="{3CF5C418-0088-45CB-8BB7-5481218A1D3C}" type="pres">
       <dgm:prSet presAssocID="{B4DF41A4-27CF-4137-A10B-EE6AFE441123}" presName="parSh" presStyleLbl="node1" presStyleIdx="2" presStyleCnt="4" custScaleX="127161"/>
       <dgm:spPr/>
+      <dgm:t>
+        <a:bodyPr/>
+        <a:lstStyle/>
+        <a:p>
+          <a:endParaRPr lang="es-ES"/>
+        </a:p>
+      </dgm:t>
     </dgm:pt>
     <dgm:pt modelId="{D805C2BA-0FFD-4B93-8248-DC0ABFFA4568}" type="pres">
       <dgm:prSet presAssocID="{B4DF41A4-27CF-4137-A10B-EE6AFE441123}" presName="desTx" presStyleLbl="fgAcc1" presStyleIdx="2" presStyleCnt="4">
@@ -1595,14 +1690,35 @@
         </dgm:presLayoutVars>
       </dgm:prSet>
       <dgm:spPr/>
+      <dgm:t>
+        <a:bodyPr/>
+        <a:lstStyle/>
+        <a:p>
+          <a:endParaRPr lang="es-ES"/>
+        </a:p>
+      </dgm:t>
     </dgm:pt>
     <dgm:pt modelId="{5CC8F97A-34DC-4ABC-8F5F-5E69D5A87645}" type="pres">
       <dgm:prSet presAssocID="{80924495-4125-489F-9479-57BC0BD91A44}" presName="sibTrans" presStyleLbl="sibTrans2D1" presStyleIdx="2" presStyleCnt="3"/>
       <dgm:spPr/>
+      <dgm:t>
+        <a:bodyPr/>
+        <a:lstStyle/>
+        <a:p>
+          <a:endParaRPr lang="es-ES"/>
+        </a:p>
+      </dgm:t>
     </dgm:pt>
     <dgm:pt modelId="{653C4DF2-2C54-4BA2-AA14-C9D0DACFD5B8}" type="pres">
       <dgm:prSet presAssocID="{80924495-4125-489F-9479-57BC0BD91A44}" presName="connTx" presStyleLbl="sibTrans2D1" presStyleIdx="2" presStyleCnt="3"/>
       <dgm:spPr/>
+      <dgm:t>
+        <a:bodyPr/>
+        <a:lstStyle/>
+        <a:p>
+          <a:endParaRPr lang="es-ES"/>
+        </a:p>
+      </dgm:t>
     </dgm:pt>
     <dgm:pt modelId="{8DB08D07-62B1-4214-BB51-E6B36053087C}" type="pres">
       <dgm:prSet presAssocID="{62A2A740-02AA-44BA-B14C-8EA0290C9406}" presName="composite" presStyleCnt="0"/>
@@ -1617,10 +1733,24 @@
         </dgm:presLayoutVars>
       </dgm:prSet>
       <dgm:spPr/>
+      <dgm:t>
+        <a:bodyPr/>
+        <a:lstStyle/>
+        <a:p>
+          <a:endParaRPr lang="es-ES"/>
+        </a:p>
+      </dgm:t>
     </dgm:pt>
     <dgm:pt modelId="{B6CF3BF9-9286-4E4B-B82B-657382B6C901}" type="pres">
       <dgm:prSet presAssocID="{62A2A740-02AA-44BA-B14C-8EA0290C9406}" presName="parSh" presStyleLbl="node1" presStyleIdx="3" presStyleCnt="4"/>
       <dgm:spPr/>
+      <dgm:t>
+        <a:bodyPr/>
+        <a:lstStyle/>
+        <a:p>
+          <a:endParaRPr lang="es-ES"/>
+        </a:p>
+      </dgm:t>
     </dgm:pt>
     <dgm:pt modelId="{ECA19675-F8FF-45FC-ABCA-FD5D8E8A6026}" type="pres">
       <dgm:prSet presAssocID="{62A2A740-02AA-44BA-B14C-8EA0290C9406}" presName="desTx" presStyleLbl="fgAcc1" presStyleIdx="3" presStyleCnt="4">
@@ -1629,44 +1759,51 @@
         </dgm:presLayoutVars>
       </dgm:prSet>
       <dgm:spPr/>
+      <dgm:t>
+        <a:bodyPr/>
+        <a:lstStyle/>
+        <a:p>
+          <a:endParaRPr lang="es-ES"/>
+        </a:p>
+      </dgm:t>
     </dgm:pt>
   </dgm:ptLst>
   <dgm:cxnLst>
+    <dgm:cxn modelId="{EF8851D3-B525-461F-B803-4A7933630737}" srcId="{8E9E8EAE-C51B-43BB-AB85-A07B7A42250B}" destId="{0E5B48D1-195C-42AE-8560-A8F090D2D731}" srcOrd="0" destOrd="0" parTransId="{E9925DEE-1E5A-438D-BEB9-E7A707E6E533}" sibTransId="{BCD9CC88-A22A-4BE4-B805-373A32706650}"/>
+    <dgm:cxn modelId="{2099223B-BDBC-48FC-8D08-CD7568636C2D}" type="presOf" srcId="{C96FDFC3-2252-4341-BAA9-6A2E0295E737}" destId="{C6761EF3-66FA-4B14-92BF-D2A06FE81CE9}" srcOrd="0" destOrd="2" presId="urn:microsoft.com/office/officeart/2005/8/layout/process3"/>
+    <dgm:cxn modelId="{62DBC681-DCE7-486D-82BC-7D9B3B73566F}" srcId="{8E9E8EAE-C51B-43BB-AB85-A07B7A42250B}" destId="{BEB4FEF3-C155-43D6-AD17-13110221F3BC}" srcOrd="1" destOrd="0" parTransId="{B08D8101-D53F-460A-9074-186CB914EB7D}" sibTransId="{494C5A1F-EF5D-4663-A4FF-CB634D5F81DC}"/>
+    <dgm:cxn modelId="{A4E547AD-E759-4FA2-88BE-937B5AEEF6C9}" type="presOf" srcId="{CDB6FA27-D583-4260-AA26-84D379DFA717}" destId="{ADF8F87A-B442-4640-849F-83C75E8EF929}" srcOrd="0" destOrd="0" presId="urn:microsoft.com/office/officeart/2005/8/layout/process3"/>
+    <dgm:cxn modelId="{646528CE-6E2C-4CD4-80A4-1003AA9B1C4B}" type="presOf" srcId="{CDB6FA27-D583-4260-AA26-84D379DFA717}" destId="{9AF69F07-8AE2-40C2-A400-56FDAB4ACE6A}" srcOrd="1" destOrd="0" presId="urn:microsoft.com/office/officeart/2005/8/layout/process3"/>
+    <dgm:cxn modelId="{7854B4FB-3D9C-4033-8FD3-C1D72FFA2E2B}" type="presOf" srcId="{80924495-4125-489F-9479-57BC0BD91A44}" destId="{5CC8F97A-34DC-4ABC-8F5F-5E69D5A87645}" srcOrd="0" destOrd="0" presId="urn:microsoft.com/office/officeart/2005/8/layout/process3"/>
+    <dgm:cxn modelId="{1494C5E8-F79A-4FA1-BABF-50F926DB07A2}" type="presOf" srcId="{BEB4FEF3-C155-43D6-AD17-13110221F3BC}" destId="{C6761EF3-66FA-4B14-92BF-D2A06FE81CE9}" srcOrd="0" destOrd="1" presId="urn:microsoft.com/office/officeart/2005/8/layout/process3"/>
     <dgm:cxn modelId="{FDF58601-5085-4BAF-ACAD-FC051A68EF6C}" srcId="{D47754FE-3154-4F9F-9E2B-4221CEEAA210}" destId="{69CA003F-6B59-401F-B758-288631CADEBC}" srcOrd="0" destOrd="0" parTransId="{BBF737C2-B615-460E-BE03-AD3A51FE79CF}" sibTransId="{6A3F8AC1-E9BF-4E71-B2EF-DFF2AC28FF88}"/>
+    <dgm:cxn modelId="{C9F4A961-2F1E-4515-B264-21192EB9D9AE}" type="presOf" srcId="{B4DF41A4-27CF-4137-A10B-EE6AFE441123}" destId="{360F57FC-C640-481B-A017-4D2B929CC74E}" srcOrd="0" destOrd="0" presId="urn:microsoft.com/office/officeart/2005/8/layout/process3"/>
+    <dgm:cxn modelId="{4ED9C596-61DF-4EF1-AF18-FE595F019FD8}" type="presOf" srcId="{123588F0-CE72-4B1F-8B84-5553302DB827}" destId="{62DBB75B-493D-4ED1-8514-A72E66E97119}" srcOrd="1" destOrd="0" presId="urn:microsoft.com/office/officeart/2005/8/layout/process3"/>
+    <dgm:cxn modelId="{5C543995-4A95-4834-943E-4355BCBE113F}" type="presOf" srcId="{8E9E8EAE-C51B-43BB-AB85-A07B7A42250B}" destId="{97979297-E9CB-4815-8E97-63384DB01CAD}" srcOrd="0" destOrd="0" presId="urn:microsoft.com/office/officeart/2005/8/layout/process3"/>
+    <dgm:cxn modelId="{4B65C2A5-0A73-44E2-949F-CA4D71F864BA}" srcId="{D47754FE-3154-4F9F-9E2B-4221CEEAA210}" destId="{9535B3D5-2E4E-4479-8B81-68F108B4E1B1}" srcOrd="2" destOrd="0" parTransId="{D9FF943B-1116-49C8-9996-6FCA1F4D7CB4}" sibTransId="{99F46589-2494-471C-A019-4535CDB980C7}"/>
+    <dgm:cxn modelId="{7DAD02C2-C926-42E6-87AA-F71FBA89B5F2}" srcId="{B4DF41A4-27CF-4137-A10B-EE6AFE441123}" destId="{54F1FFCF-D2CF-400C-8A54-1CD2AD4B846B}" srcOrd="0" destOrd="0" parTransId="{331E3A34-7AE9-49EF-91CD-2221AD729316}" sibTransId="{A7040E73-FA28-425C-90CA-890311AEB3D7}"/>
+    <dgm:cxn modelId="{ED5B0A85-B536-4275-BE58-5C4ECA183844}" srcId="{EB6EB4FA-5A72-403F-BE71-7EDB5249E1DA}" destId="{62A2A740-02AA-44BA-B14C-8EA0290C9406}" srcOrd="3" destOrd="0" parTransId="{2365BB5F-A8D3-46C1-93FA-713B69089859}" sibTransId="{7CB4EC55-F000-461B-899B-A761971704EA}"/>
     <dgm:cxn modelId="{EE13D012-A8D8-408D-94AE-361D784F01AB}" srcId="{EB6EB4FA-5A72-403F-BE71-7EDB5249E1DA}" destId="{D47754FE-3154-4F9F-9E2B-4221CEEAA210}" srcOrd="0" destOrd="0" parTransId="{8423D843-01DF-408B-9D5D-D22E6A1060A6}" sibTransId="{123588F0-CE72-4B1F-8B84-5553302DB827}"/>
+    <dgm:cxn modelId="{97E89B1E-08B1-4CD1-A927-F0413B7D74C3}" type="presOf" srcId="{8E9E8EAE-C51B-43BB-AB85-A07B7A42250B}" destId="{6E69A30B-E30E-4A4A-903F-9C45B8148E8A}" srcOrd="1" destOrd="0" presId="urn:microsoft.com/office/officeart/2005/8/layout/process3"/>
+    <dgm:cxn modelId="{B2AEF29E-38A8-4926-9B6F-151498CB7592}" type="presOf" srcId="{80924495-4125-489F-9479-57BC0BD91A44}" destId="{653C4DF2-2C54-4BA2-AA14-C9D0DACFD5B8}" srcOrd="1" destOrd="0" presId="urn:microsoft.com/office/officeart/2005/8/layout/process3"/>
     <dgm:cxn modelId="{70613614-3A16-4471-9057-1D2CCC1A5D40}" type="presOf" srcId="{A7517125-A20F-412D-988A-3F599C50B404}" destId="{ECA19675-F8FF-45FC-ABCA-FD5D8E8A6026}" srcOrd="0" destOrd="0" presId="urn:microsoft.com/office/officeart/2005/8/layout/process3"/>
+    <dgm:cxn modelId="{90267F67-BEC8-4401-AE1F-5B98EE15D3A3}" type="presOf" srcId="{62A2A740-02AA-44BA-B14C-8EA0290C9406}" destId="{B6CF3BF9-9286-4E4B-B82B-657382B6C901}" srcOrd="1" destOrd="0" presId="urn:microsoft.com/office/officeart/2005/8/layout/process3"/>
+    <dgm:cxn modelId="{C12B1FAA-12B9-49BF-BC32-784FA6E2AC79}" srcId="{D47754FE-3154-4F9F-9E2B-4221CEEAA210}" destId="{B72F0616-DF75-40C1-968D-D75C81F010B3}" srcOrd="1" destOrd="0" parTransId="{55E406A9-5BC5-4BE5-9DE7-4FEF29E3C903}" sibTransId="{28021ADB-8108-484A-88CC-0D219F7C67E0}"/>
+    <dgm:cxn modelId="{423BF34D-D4AB-485C-8789-13D82B5EC072}" type="presOf" srcId="{EB6EB4FA-5A72-403F-BE71-7EDB5249E1DA}" destId="{5B67E884-2419-45CE-A7D2-821B89DAFA50}" srcOrd="0" destOrd="0" presId="urn:microsoft.com/office/officeart/2005/8/layout/process3"/>
+    <dgm:cxn modelId="{967B478A-F489-4070-972D-80D00C6D3F3F}" type="presOf" srcId="{62A2A740-02AA-44BA-B14C-8EA0290C9406}" destId="{06BC847A-176B-4C4C-A3DD-A3B57EB9E1F3}" srcOrd="0" destOrd="0" presId="urn:microsoft.com/office/officeart/2005/8/layout/process3"/>
+    <dgm:cxn modelId="{9ECE3AC6-3C76-414B-80A3-32C3C6FE3257}" type="presOf" srcId="{D47754FE-3154-4F9F-9E2B-4221CEEAA210}" destId="{1C18F407-5922-4EDC-B315-460C310DA38A}" srcOrd="0" destOrd="0" presId="urn:microsoft.com/office/officeart/2005/8/layout/process3"/>
+    <dgm:cxn modelId="{9FB01E56-1BE2-4F30-8E13-0B2DF2D6F8FA}" srcId="{62A2A740-02AA-44BA-B14C-8EA0290C9406}" destId="{A7517125-A20F-412D-988A-3F599C50B404}" srcOrd="0" destOrd="0" parTransId="{6DBB3196-B92F-494B-992C-6A2FD90AAAEE}" sibTransId="{EDB8967D-34BA-4CE8-9FCE-FA1ECF6CF08F}"/>
     <dgm:cxn modelId="{CF99661B-A677-475A-B760-60E7DA30078A}" type="presOf" srcId="{54F1FFCF-D2CF-400C-8A54-1CD2AD4B846B}" destId="{D805C2BA-0FFD-4B93-8248-DC0ABFFA4568}" srcOrd="0" destOrd="0" presId="urn:microsoft.com/office/officeart/2005/8/layout/process3"/>
-    <dgm:cxn modelId="{97E89B1E-08B1-4CD1-A927-F0413B7D74C3}" type="presOf" srcId="{8E9E8EAE-C51B-43BB-AB85-A07B7A42250B}" destId="{6E69A30B-E30E-4A4A-903F-9C45B8148E8A}" srcOrd="1" destOrd="0" presId="urn:microsoft.com/office/officeart/2005/8/layout/process3"/>
     <dgm:cxn modelId="{3359F927-6C37-45F4-A05F-D936AF81902F}" type="presOf" srcId="{123588F0-CE72-4B1F-8B84-5553302DB827}" destId="{88E2B1E4-04B5-41FA-A12F-BE67D51B6C5F}" srcOrd="0" destOrd="0" presId="urn:microsoft.com/office/officeart/2005/8/layout/process3"/>
+    <dgm:cxn modelId="{ECEDFA71-0C01-4F73-8950-45DD0B7371AB}" type="presOf" srcId="{D47754FE-3154-4F9F-9E2B-4221CEEAA210}" destId="{5BB44648-10DE-43B4-B115-41EF1A186346}" srcOrd="1" destOrd="0" presId="urn:microsoft.com/office/officeart/2005/8/layout/process3"/>
     <dgm:cxn modelId="{39E8702C-A9CA-4DBB-82BC-3F04047854BD}" type="presOf" srcId="{9535B3D5-2E4E-4479-8B81-68F108B4E1B1}" destId="{D02E87F5-91E0-4C1F-A5B8-0BA8CF87E582}" srcOrd="0" destOrd="2" presId="urn:microsoft.com/office/officeart/2005/8/layout/process3"/>
-    <dgm:cxn modelId="{2099223B-BDBC-48FC-8D08-CD7568636C2D}" type="presOf" srcId="{C96FDFC3-2252-4341-BAA9-6A2E0295E737}" destId="{C6761EF3-66FA-4B14-92BF-D2A06FE81CE9}" srcOrd="0" destOrd="2" presId="urn:microsoft.com/office/officeart/2005/8/layout/process3"/>
-    <dgm:cxn modelId="{C9F4A961-2F1E-4515-B264-21192EB9D9AE}" type="presOf" srcId="{B4DF41A4-27CF-4137-A10B-EE6AFE441123}" destId="{360F57FC-C640-481B-A017-4D2B929CC74E}" srcOrd="0" destOrd="0" presId="urn:microsoft.com/office/officeart/2005/8/layout/process3"/>
-    <dgm:cxn modelId="{90267F67-BEC8-4401-AE1F-5B98EE15D3A3}" type="presOf" srcId="{62A2A740-02AA-44BA-B14C-8EA0290C9406}" destId="{B6CF3BF9-9286-4E4B-B82B-657382B6C901}" srcOrd="1" destOrd="0" presId="urn:microsoft.com/office/officeart/2005/8/layout/process3"/>
-    <dgm:cxn modelId="{423BF34D-D4AB-485C-8789-13D82B5EC072}" type="presOf" srcId="{EB6EB4FA-5A72-403F-BE71-7EDB5249E1DA}" destId="{5B67E884-2419-45CE-A7D2-821B89DAFA50}" srcOrd="0" destOrd="0" presId="urn:microsoft.com/office/officeart/2005/8/layout/process3"/>
-    <dgm:cxn modelId="{ECEDFA71-0C01-4F73-8950-45DD0B7371AB}" type="presOf" srcId="{D47754FE-3154-4F9F-9E2B-4221CEEAA210}" destId="{5BB44648-10DE-43B4-B115-41EF1A186346}" srcOrd="1" destOrd="0" presId="urn:microsoft.com/office/officeart/2005/8/layout/process3"/>
-    <dgm:cxn modelId="{9FB01E56-1BE2-4F30-8E13-0B2DF2D6F8FA}" srcId="{62A2A740-02AA-44BA-B14C-8EA0290C9406}" destId="{A7517125-A20F-412D-988A-3F599C50B404}" srcOrd="0" destOrd="0" parTransId="{6DBB3196-B92F-494B-992C-6A2FD90AAAEE}" sibTransId="{EDB8967D-34BA-4CE8-9FCE-FA1ECF6CF08F}"/>
-    <dgm:cxn modelId="{62DBC681-DCE7-486D-82BC-7D9B3B73566F}" srcId="{8E9E8EAE-C51B-43BB-AB85-A07B7A42250B}" destId="{BEB4FEF3-C155-43D6-AD17-13110221F3BC}" srcOrd="1" destOrd="0" parTransId="{B08D8101-D53F-460A-9074-186CB914EB7D}" sibTransId="{494C5A1F-EF5D-4663-A4FF-CB634D5F81DC}"/>
-    <dgm:cxn modelId="{ED5B0A85-B536-4275-BE58-5C4ECA183844}" srcId="{EB6EB4FA-5A72-403F-BE71-7EDB5249E1DA}" destId="{62A2A740-02AA-44BA-B14C-8EA0290C9406}" srcOrd="3" destOrd="0" parTransId="{2365BB5F-A8D3-46C1-93FA-713B69089859}" sibTransId="{7CB4EC55-F000-461B-899B-A761971704EA}"/>
-    <dgm:cxn modelId="{967B478A-F489-4070-972D-80D00C6D3F3F}" type="presOf" srcId="{62A2A740-02AA-44BA-B14C-8EA0290C9406}" destId="{06BC847A-176B-4C4C-A3DD-A3B57EB9E1F3}" srcOrd="0" destOrd="0" presId="urn:microsoft.com/office/officeart/2005/8/layout/process3"/>
+    <dgm:cxn modelId="{4CCA75A7-1236-4E98-9C3B-5DCCBB4E61CE}" type="presOf" srcId="{0E5B48D1-195C-42AE-8560-A8F090D2D731}" destId="{C6761EF3-66FA-4B14-92BF-D2A06FE81CE9}" srcOrd="0" destOrd="0" presId="urn:microsoft.com/office/officeart/2005/8/layout/process3"/>
     <dgm:cxn modelId="{83F74B90-B7A5-425D-8BB6-F349E2E7BE02}" srcId="{EB6EB4FA-5A72-403F-BE71-7EDB5249E1DA}" destId="{B4DF41A4-27CF-4137-A10B-EE6AFE441123}" srcOrd="2" destOrd="0" parTransId="{04F8B9A1-9F9D-4402-A624-5142FA854A05}" sibTransId="{80924495-4125-489F-9479-57BC0BD91A44}"/>
-    <dgm:cxn modelId="{5C543995-4A95-4834-943E-4355BCBE113F}" type="presOf" srcId="{8E9E8EAE-C51B-43BB-AB85-A07B7A42250B}" destId="{97979297-E9CB-4815-8E97-63384DB01CAD}" srcOrd="0" destOrd="0" presId="urn:microsoft.com/office/officeart/2005/8/layout/process3"/>
-    <dgm:cxn modelId="{4ED9C596-61DF-4EF1-AF18-FE595F019FD8}" type="presOf" srcId="{123588F0-CE72-4B1F-8B84-5553302DB827}" destId="{62DBB75B-493D-4ED1-8514-A72E66E97119}" srcOrd="1" destOrd="0" presId="urn:microsoft.com/office/officeart/2005/8/layout/process3"/>
+    <dgm:cxn modelId="{1A93E9A8-CB80-447C-B874-6015CC21ACAB}" srcId="{8E9E8EAE-C51B-43BB-AB85-A07B7A42250B}" destId="{C96FDFC3-2252-4341-BAA9-6A2E0295E737}" srcOrd="2" destOrd="0" parTransId="{5F3E278E-2307-4799-A275-D36D7908844E}" sibTransId="{575DEABC-D156-4840-89B3-E9B3B98D700E}"/>
+    <dgm:cxn modelId="{3C6047CD-0662-4C53-A08C-23931375F78E}" type="presOf" srcId="{69CA003F-6B59-401F-B758-288631CADEBC}" destId="{D02E87F5-91E0-4C1F-A5B8-0BA8CF87E582}" srcOrd="0" destOrd="0" presId="urn:microsoft.com/office/officeart/2005/8/layout/process3"/>
     <dgm:cxn modelId="{9E5BD89E-3CE9-45FA-B87E-0BBB967FD0E5}" srcId="{EB6EB4FA-5A72-403F-BE71-7EDB5249E1DA}" destId="{8E9E8EAE-C51B-43BB-AB85-A07B7A42250B}" srcOrd="1" destOrd="0" parTransId="{61572377-88BA-41BA-82C3-6ED78DEADAD5}" sibTransId="{CDB6FA27-D583-4260-AA26-84D379DFA717}"/>
-    <dgm:cxn modelId="{B2AEF29E-38A8-4926-9B6F-151498CB7592}" type="presOf" srcId="{80924495-4125-489F-9479-57BC0BD91A44}" destId="{653C4DF2-2C54-4BA2-AA14-C9D0DACFD5B8}" srcOrd="1" destOrd="0" presId="urn:microsoft.com/office/officeart/2005/8/layout/process3"/>
-    <dgm:cxn modelId="{4B65C2A5-0A73-44E2-949F-CA4D71F864BA}" srcId="{D47754FE-3154-4F9F-9E2B-4221CEEAA210}" destId="{9535B3D5-2E4E-4479-8B81-68F108B4E1B1}" srcOrd="2" destOrd="0" parTransId="{D9FF943B-1116-49C8-9996-6FCA1F4D7CB4}" sibTransId="{99F46589-2494-471C-A019-4535CDB980C7}"/>
-    <dgm:cxn modelId="{4CCA75A7-1236-4E98-9C3B-5DCCBB4E61CE}" type="presOf" srcId="{0E5B48D1-195C-42AE-8560-A8F090D2D731}" destId="{C6761EF3-66FA-4B14-92BF-D2A06FE81CE9}" srcOrd="0" destOrd="0" presId="urn:microsoft.com/office/officeart/2005/8/layout/process3"/>
-    <dgm:cxn modelId="{1A93E9A8-CB80-447C-B874-6015CC21ACAB}" srcId="{8E9E8EAE-C51B-43BB-AB85-A07B7A42250B}" destId="{C96FDFC3-2252-4341-BAA9-6A2E0295E737}" srcOrd="2" destOrd="0" parTransId="{5F3E278E-2307-4799-A275-D36D7908844E}" sibTransId="{575DEABC-D156-4840-89B3-E9B3B98D700E}"/>
-    <dgm:cxn modelId="{C12B1FAA-12B9-49BF-BC32-784FA6E2AC79}" srcId="{D47754FE-3154-4F9F-9E2B-4221CEEAA210}" destId="{B72F0616-DF75-40C1-968D-D75C81F010B3}" srcOrd="1" destOrd="0" parTransId="{55E406A9-5BC5-4BE5-9DE7-4FEF29E3C903}" sibTransId="{28021ADB-8108-484A-88CC-0D219F7C67E0}"/>
-    <dgm:cxn modelId="{A4E547AD-E759-4FA2-88BE-937B5AEEF6C9}" type="presOf" srcId="{CDB6FA27-D583-4260-AA26-84D379DFA717}" destId="{ADF8F87A-B442-4640-849F-83C75E8EF929}" srcOrd="0" destOrd="0" presId="urn:microsoft.com/office/officeart/2005/8/layout/process3"/>
-    <dgm:cxn modelId="{7DAD02C2-C926-42E6-87AA-F71FBA89B5F2}" srcId="{B4DF41A4-27CF-4137-A10B-EE6AFE441123}" destId="{54F1FFCF-D2CF-400C-8A54-1CD2AD4B846B}" srcOrd="0" destOrd="0" parTransId="{331E3A34-7AE9-49EF-91CD-2221AD729316}" sibTransId="{A7040E73-FA28-425C-90CA-890311AEB3D7}"/>
+    <dgm:cxn modelId="{575B5AFC-8FD9-4718-8AAC-719D93888372}" type="presOf" srcId="{B4DF41A4-27CF-4137-A10B-EE6AFE441123}" destId="{3CF5C418-0088-45CB-8BB7-5481218A1D3C}" srcOrd="1" destOrd="0" presId="urn:microsoft.com/office/officeart/2005/8/layout/process3"/>
     <dgm:cxn modelId="{3C04B9C4-947C-46EF-809E-AABCD6AA7DF4}" type="presOf" srcId="{B72F0616-DF75-40C1-968D-D75C81F010B3}" destId="{D02E87F5-91E0-4C1F-A5B8-0BA8CF87E582}" srcOrd="0" destOrd="1" presId="urn:microsoft.com/office/officeart/2005/8/layout/process3"/>
-    <dgm:cxn modelId="{9ECE3AC6-3C76-414B-80A3-32C3C6FE3257}" type="presOf" srcId="{D47754FE-3154-4F9F-9E2B-4221CEEAA210}" destId="{1C18F407-5922-4EDC-B315-460C310DA38A}" srcOrd="0" destOrd="0" presId="urn:microsoft.com/office/officeart/2005/8/layout/process3"/>
-    <dgm:cxn modelId="{3C6047CD-0662-4C53-A08C-23931375F78E}" type="presOf" srcId="{69CA003F-6B59-401F-B758-288631CADEBC}" destId="{D02E87F5-91E0-4C1F-A5B8-0BA8CF87E582}" srcOrd="0" destOrd="0" presId="urn:microsoft.com/office/officeart/2005/8/layout/process3"/>
-    <dgm:cxn modelId="{646528CE-6E2C-4CD4-80A4-1003AA9B1C4B}" type="presOf" srcId="{CDB6FA27-D583-4260-AA26-84D379DFA717}" destId="{9AF69F07-8AE2-40C2-A400-56FDAB4ACE6A}" srcOrd="1" destOrd="0" presId="urn:microsoft.com/office/officeart/2005/8/layout/process3"/>
-    <dgm:cxn modelId="{EF8851D3-B525-461F-B803-4A7933630737}" srcId="{8E9E8EAE-C51B-43BB-AB85-A07B7A42250B}" destId="{0E5B48D1-195C-42AE-8560-A8F090D2D731}" srcOrd="0" destOrd="0" parTransId="{E9925DEE-1E5A-438D-BEB9-E7A707E6E533}" sibTransId="{BCD9CC88-A22A-4BE4-B805-373A32706650}"/>
-    <dgm:cxn modelId="{1494C5E8-F79A-4FA1-BABF-50F926DB07A2}" type="presOf" srcId="{BEB4FEF3-C155-43D6-AD17-13110221F3BC}" destId="{C6761EF3-66FA-4B14-92BF-D2A06FE81CE9}" srcOrd="0" destOrd="1" presId="urn:microsoft.com/office/officeart/2005/8/layout/process3"/>
-    <dgm:cxn modelId="{7854B4FB-3D9C-4033-8FD3-C1D72FFA2E2B}" type="presOf" srcId="{80924495-4125-489F-9479-57BC0BD91A44}" destId="{5CC8F97A-34DC-4ABC-8F5F-5E69D5A87645}" srcOrd="0" destOrd="0" presId="urn:microsoft.com/office/officeart/2005/8/layout/process3"/>
-    <dgm:cxn modelId="{575B5AFC-8FD9-4718-8AAC-719D93888372}" type="presOf" srcId="{B4DF41A4-27CF-4137-A10B-EE6AFE441123}" destId="{3CF5C418-0088-45CB-8BB7-5481218A1D3C}" srcOrd="1" destOrd="0" presId="urn:microsoft.com/office/officeart/2005/8/layout/process3"/>
     <dgm:cxn modelId="{909EF691-DB80-4A40-8E29-6FF17A41E87E}" type="presParOf" srcId="{5B67E884-2419-45CE-A7D2-821B89DAFA50}" destId="{02BE49C7-665B-4C3D-A106-CA427F48BCAF}" srcOrd="0" destOrd="0" presId="urn:microsoft.com/office/officeart/2005/8/layout/process3"/>
     <dgm:cxn modelId="{C8B108CA-DB1F-4E45-9DFE-4FE195D6E499}" type="presParOf" srcId="{02BE49C7-665B-4C3D-A106-CA427F48BCAF}" destId="{1C18F407-5922-4EDC-B315-460C310DA38A}" srcOrd="0" destOrd="0" presId="urn:microsoft.com/office/officeart/2005/8/layout/process3"/>
     <dgm:cxn modelId="{093EC1D5-057C-4CEC-846C-7BEA7BAC285A}" type="presParOf" srcId="{02BE49C7-665B-4C3D-A106-CA427F48BCAF}" destId="{5BB44648-10DE-43B4-B115-41EF1A186346}" srcOrd="1" destOrd="0" presId="urn:microsoft.com/office/officeart/2005/8/layout/process3"/>
@@ -1765,7 +1902,7 @@
         </a:bodyPr>
         <a:lstStyle/>
         <a:p>
-          <a:pPr marL="0" lvl="0" indent="0" algn="l" defTabSz="533400">
+          <a:pPr lvl="0" algn="l" defTabSz="533400">
             <a:lnSpc>
               <a:spcPct val="90000"/>
             </a:lnSpc>
@@ -1775,7 +1912,6 @@
             <a:spcAft>
               <a:spcPct val="35000"/>
             </a:spcAft>
-            <a:buNone/>
           </a:pPr>
           <a:r>
             <a:rPr lang="es-ES" sz="1200" b="1" kern="1200" dirty="0">
@@ -1786,7 +1922,7 @@
           </a:r>
         </a:p>
         <a:p>
-          <a:pPr marL="0" lvl="0" indent="0" algn="l" defTabSz="533400">
+          <a:pPr lvl="0" algn="l" defTabSz="533400">
             <a:lnSpc>
               <a:spcPct val="90000"/>
             </a:lnSpc>
@@ -1796,7 +1932,6 @@
             <a:spcAft>
               <a:spcPct val="35000"/>
             </a:spcAft>
-            <a:buNone/>
           </a:pPr>
           <a:r>
             <a:rPr lang="es-ES" sz="1200" b="1" kern="1200" dirty="0">
@@ -1878,7 +2013,7 @@
             <a:spcAft>
               <a:spcPct val="15000"/>
             </a:spcAft>
-            <a:buChar char="•"/>
+            <a:buChar char="••"/>
           </a:pPr>
           <a:r>
             <a:rPr lang="es-CO" sz="1200" b="1" kern="1200" dirty="0">
@@ -1903,7 +2038,7 @@
             <a:spcAft>
               <a:spcPct val="15000"/>
             </a:spcAft>
-            <a:buChar char="•"/>
+            <a:buChar char="••"/>
           </a:pPr>
           <a:r>
             <a:rPr lang="es-CO" sz="1200" b="1" kern="1200" dirty="0">
@@ -1924,7 +2059,7 @@
             <a:spcAft>
               <a:spcPct val="15000"/>
             </a:spcAft>
-            <a:buChar char="•"/>
+            <a:buChar char="••"/>
           </a:pPr>
           <a:r>
             <a:rPr lang="es-CO" sz="1200" b="1" kern="1200" dirty="0">
@@ -1990,7 +2125,7 @@
         </a:bodyPr>
         <a:lstStyle/>
         <a:p>
-          <a:pPr marL="0" lvl="0" indent="0" algn="ctr" defTabSz="533400">
+          <a:pPr lvl="0" algn="ctr" defTabSz="533400">
             <a:lnSpc>
               <a:spcPct val="90000"/>
             </a:lnSpc>
@@ -2000,7 +2135,6 @@
             <a:spcAft>
               <a:spcPct val="35000"/>
             </a:spcAft>
-            <a:buNone/>
           </a:pPr>
           <a:endParaRPr lang="es-ES" sz="1200" kern="1200">
             <a:latin typeface="Arial" panose="020B0604020202020204" pitchFamily="34" charset="0"/>
@@ -2070,7 +2204,7 @@
         </a:bodyPr>
         <a:lstStyle/>
         <a:p>
-          <a:pPr marL="0" lvl="0" indent="0" algn="l" defTabSz="533400">
+          <a:pPr lvl="0" algn="l" defTabSz="533400">
             <a:lnSpc>
               <a:spcPct val="90000"/>
             </a:lnSpc>
@@ -2080,7 +2214,6 @@
             <a:spcAft>
               <a:spcPct val="35000"/>
             </a:spcAft>
-            <a:buNone/>
           </a:pPr>
           <a:r>
             <a:rPr lang="es-ES" sz="1200" b="1" kern="1200" dirty="0">
@@ -2091,7 +2224,7 @@
           </a:r>
         </a:p>
         <a:p>
-          <a:pPr marL="0" lvl="0" indent="0" algn="l" defTabSz="533400">
+          <a:pPr lvl="0" algn="l" defTabSz="533400">
             <a:lnSpc>
               <a:spcPct val="90000"/>
             </a:lnSpc>
@@ -2101,7 +2234,6 @@
             <a:spcAft>
               <a:spcPct val="35000"/>
             </a:spcAft>
-            <a:buNone/>
           </a:pPr>
           <a:r>
             <a:rPr lang="es-ES" sz="1200" b="1" kern="1200" dirty="0">
@@ -2183,7 +2315,7 @@
             <a:spcAft>
               <a:spcPct val="15000"/>
             </a:spcAft>
-            <a:buChar char="•"/>
+            <a:buChar char="••"/>
           </a:pPr>
           <a:r>
             <a:rPr lang="es-CO" sz="1200" b="1" kern="1200" dirty="0">
@@ -2208,7 +2340,7 @@
             <a:spcAft>
               <a:spcPct val="15000"/>
             </a:spcAft>
-            <a:buChar char="•"/>
+            <a:buChar char="••"/>
           </a:pPr>
           <a:r>
             <a:rPr lang="es-CO" sz="1200" b="1" kern="1200" dirty="0">
@@ -2229,7 +2361,7 @@
             <a:spcAft>
               <a:spcPct val="15000"/>
             </a:spcAft>
-            <a:buChar char="•"/>
+            <a:buChar char="••"/>
           </a:pPr>
           <a:r>
             <a:rPr lang="es-CO" sz="1200" b="1" kern="1200" dirty="0">
@@ -2295,7 +2427,7 @@
         </a:bodyPr>
         <a:lstStyle/>
         <a:p>
-          <a:pPr marL="0" lvl="0" indent="0" algn="ctr" defTabSz="533400">
+          <a:pPr lvl="0" algn="ctr" defTabSz="533400">
             <a:lnSpc>
               <a:spcPct val="90000"/>
             </a:lnSpc>
@@ -2305,7 +2437,6 @@
             <a:spcAft>
               <a:spcPct val="35000"/>
             </a:spcAft>
-            <a:buNone/>
           </a:pPr>
           <a:endParaRPr lang="es-ES" sz="1200" kern="1200">
             <a:latin typeface="Arial" panose="020B0604020202020204" pitchFamily="34" charset="0"/>
@@ -2375,7 +2506,7 @@
         </a:bodyPr>
         <a:lstStyle/>
         <a:p>
-          <a:pPr marL="0" lvl="0" indent="0" algn="l" defTabSz="533400">
+          <a:pPr lvl="0" algn="l" defTabSz="533400">
             <a:lnSpc>
               <a:spcPct val="90000"/>
             </a:lnSpc>
@@ -2385,7 +2516,6 @@
             <a:spcAft>
               <a:spcPct val="35000"/>
             </a:spcAft>
-            <a:buNone/>
           </a:pPr>
           <a:r>
             <a:rPr lang="es-ES" sz="1200" b="1" kern="1200" dirty="0">
@@ -2396,7 +2526,7 @@
           </a:r>
         </a:p>
         <a:p>
-          <a:pPr marL="0" lvl="0" indent="0" algn="l" defTabSz="533400">
+          <a:pPr lvl="0" algn="l" defTabSz="533400">
             <a:lnSpc>
               <a:spcPct val="90000"/>
             </a:lnSpc>
@@ -2406,7 +2536,6 @@
             <a:spcAft>
               <a:spcPct val="35000"/>
             </a:spcAft>
-            <a:buNone/>
           </a:pPr>
           <a:r>
             <a:rPr lang="es-ES" sz="1200" b="1" kern="1200" dirty="0">
@@ -2488,7 +2617,7 @@
             <a:spcAft>
               <a:spcPct val="15000"/>
             </a:spcAft>
-            <a:buChar char="•"/>
+            <a:buChar char="••"/>
           </a:pPr>
           <a:r>
             <a:rPr lang="es-CO" sz="1200" b="1" kern="1200" dirty="0">
@@ -2558,7 +2687,7 @@
         </a:bodyPr>
         <a:lstStyle/>
         <a:p>
-          <a:pPr marL="0" lvl="0" indent="0" algn="ctr" defTabSz="533400">
+          <a:pPr lvl="0" algn="ctr" defTabSz="533400">
             <a:lnSpc>
               <a:spcPct val="90000"/>
             </a:lnSpc>
@@ -2568,7 +2697,6 @@
             <a:spcAft>
               <a:spcPct val="35000"/>
             </a:spcAft>
-            <a:buNone/>
           </a:pPr>
           <a:endParaRPr lang="es-ES" sz="1200" kern="1200">
             <a:latin typeface="Arial" panose="020B0604020202020204" pitchFamily="34" charset="0"/>
@@ -2638,7 +2766,7 @@
         </a:bodyPr>
         <a:lstStyle/>
         <a:p>
-          <a:pPr marL="0" lvl="0" indent="0" algn="l" defTabSz="533400">
+          <a:pPr lvl="0" algn="l" defTabSz="533400">
             <a:lnSpc>
               <a:spcPct val="90000"/>
             </a:lnSpc>
@@ -2648,7 +2776,6 @@
             <a:spcAft>
               <a:spcPct val="35000"/>
             </a:spcAft>
-            <a:buNone/>
           </a:pPr>
           <a:r>
             <a:rPr lang="es-ES" sz="1200" b="1" kern="1200" dirty="0">
@@ -2659,7 +2786,7 @@
           </a:r>
         </a:p>
         <a:p>
-          <a:pPr marL="0" lvl="0" indent="0" algn="l" defTabSz="533400">
+          <a:pPr lvl="0" algn="l" defTabSz="533400">
             <a:lnSpc>
               <a:spcPct val="90000"/>
             </a:lnSpc>
@@ -2669,7 +2796,6 @@
             <a:spcAft>
               <a:spcPct val="35000"/>
             </a:spcAft>
-            <a:buNone/>
           </a:pPr>
           <a:r>
             <a:rPr lang="es-ES" sz="1200" b="1" kern="1200" dirty="0">
@@ -2751,7 +2877,7 @@
             <a:spcAft>
               <a:spcPct val="15000"/>
             </a:spcAft>
-            <a:buChar char="•"/>
+            <a:buChar char="••"/>
           </a:pPr>
           <a:r>
             <a:rPr lang="es-CO" sz="1200" b="1" kern="1200" dirty="0">
@@ -4192,7 +4318,7 @@
           <a:p>
             <a:fld id="{CF2D75CD-27F5-9C40-BF98-62796332CDBF}" type="datetimeFigureOut">
               <a:rPr lang="es-ES" smtClean="0"/>
-              <a:t>27/02/2020</a:t>
+              <a:t>28/02/2020</a:t>
             </a:fld>
             <a:endParaRPr lang="es-ES"/>
           </a:p>
@@ -4591,7 +4717,7 @@
           <a:p>
             <a:fld id="{E36FCCCF-5A9A-4876-93B5-B07C4A7CF72D}" type="datetimeFigureOut">
               <a:rPr lang="es-CO" smtClean="0"/>
-              <a:t>27/02/2020</a:t>
+              <a:t>28/02/2020</a:t>
             </a:fld>
             <a:endParaRPr lang="es-CO"/>
           </a:p>
@@ -4761,7 +4887,7 @@
           <a:p>
             <a:fld id="{E36FCCCF-5A9A-4876-93B5-B07C4A7CF72D}" type="datetimeFigureOut">
               <a:rPr lang="es-CO" smtClean="0"/>
-              <a:t>27/02/2020</a:t>
+              <a:t>28/02/2020</a:t>
             </a:fld>
             <a:endParaRPr lang="es-CO"/>
           </a:p>
@@ -4941,7 +5067,7 @@
           <a:p>
             <a:fld id="{E36FCCCF-5A9A-4876-93B5-B07C4A7CF72D}" type="datetimeFigureOut">
               <a:rPr lang="es-CO" smtClean="0"/>
-              <a:t>27/02/2020</a:t>
+              <a:t>28/02/2020</a:t>
             </a:fld>
             <a:endParaRPr lang="es-CO"/>
           </a:p>
@@ -5111,7 +5237,7 @@
           <a:p>
             <a:fld id="{E36FCCCF-5A9A-4876-93B5-B07C4A7CF72D}" type="datetimeFigureOut">
               <a:rPr lang="es-CO" smtClean="0"/>
-              <a:t>27/02/2020</a:t>
+              <a:t>28/02/2020</a:t>
             </a:fld>
             <a:endParaRPr lang="es-CO"/>
           </a:p>
@@ -5355,7 +5481,7 @@
           <a:p>
             <a:fld id="{E36FCCCF-5A9A-4876-93B5-B07C4A7CF72D}" type="datetimeFigureOut">
               <a:rPr lang="es-CO" smtClean="0"/>
-              <a:t>27/02/2020</a:t>
+              <a:t>28/02/2020</a:t>
             </a:fld>
             <a:endParaRPr lang="es-CO"/>
           </a:p>
@@ -5587,7 +5713,7 @@
           <a:p>
             <a:fld id="{E36FCCCF-5A9A-4876-93B5-B07C4A7CF72D}" type="datetimeFigureOut">
               <a:rPr lang="es-CO" smtClean="0"/>
-              <a:t>27/02/2020</a:t>
+              <a:t>28/02/2020</a:t>
             </a:fld>
             <a:endParaRPr lang="es-CO"/>
           </a:p>
@@ -5954,7 +6080,7 @@
           <a:p>
             <a:fld id="{E36FCCCF-5A9A-4876-93B5-B07C4A7CF72D}" type="datetimeFigureOut">
               <a:rPr lang="es-CO" smtClean="0"/>
-              <a:t>27/02/2020</a:t>
+              <a:t>28/02/2020</a:t>
             </a:fld>
             <a:endParaRPr lang="es-CO"/>
           </a:p>
@@ -6072,7 +6198,7 @@
           <a:p>
             <a:fld id="{E36FCCCF-5A9A-4876-93B5-B07C4A7CF72D}" type="datetimeFigureOut">
               <a:rPr lang="es-CO" smtClean="0"/>
-              <a:t>27/02/2020</a:t>
+              <a:t>28/02/2020</a:t>
             </a:fld>
             <a:endParaRPr lang="es-CO"/>
           </a:p>
@@ -6167,7 +6293,7 @@
           <a:p>
             <a:fld id="{E36FCCCF-5A9A-4876-93B5-B07C4A7CF72D}" type="datetimeFigureOut">
               <a:rPr lang="es-CO" smtClean="0"/>
-              <a:t>27/02/2020</a:t>
+              <a:t>28/02/2020</a:t>
             </a:fld>
             <a:endParaRPr lang="es-CO"/>
           </a:p>
@@ -6444,7 +6570,7 @@
           <a:p>
             <a:fld id="{E36FCCCF-5A9A-4876-93B5-B07C4A7CF72D}" type="datetimeFigureOut">
               <a:rPr lang="es-CO" smtClean="0"/>
-              <a:t>27/02/2020</a:t>
+              <a:t>28/02/2020</a:t>
             </a:fld>
             <a:endParaRPr lang="es-CO"/>
           </a:p>
@@ -6701,7 +6827,7 @@
           <a:p>
             <a:fld id="{E36FCCCF-5A9A-4876-93B5-B07C4A7CF72D}" type="datetimeFigureOut">
               <a:rPr lang="es-CO" smtClean="0"/>
-              <a:t>27/02/2020</a:t>
+              <a:t>28/02/2020</a:t>
             </a:fld>
             <a:endParaRPr lang="es-CO"/>
           </a:p>
@@ -6914,7 +7040,7 @@
           <a:p>
             <a:fld id="{E36FCCCF-5A9A-4876-93B5-B07C4A7CF72D}" type="datetimeFigureOut">
               <a:rPr lang="es-CO" smtClean="0"/>
-              <a:t>27/02/2020</a:t>
+              <a:t>28/02/2020</a:t>
             </a:fld>
             <a:endParaRPr lang="es-CO"/>
           </a:p>
@@ -7395,6 +7521,791 @@
           <a:lstStyle/>
           <a:p>
             <a:r>
+              <a:rPr lang="es-ES" sz="2500" b="1" dirty="0" smtClean="0">
+                <a:solidFill>
+                  <a:schemeClr val="bg1"/>
+                </a:solidFill>
+                <a:latin typeface="Arial" panose="020B0604020202020204" pitchFamily="34" charset="0"/>
+                <a:cs typeface="Arial" panose="020B0604020202020204" pitchFamily="34" charset="0"/>
+              </a:rPr>
+              <a:t>Recomendaciones</a:t>
+            </a:r>
+            <a:endParaRPr lang="es-ES" sz="2500" b="1" dirty="0">
+              <a:solidFill>
+                <a:schemeClr val="bg1"/>
+              </a:solidFill>
+              <a:latin typeface="Arial" panose="020B0604020202020204" pitchFamily="34" charset="0"/>
+              <a:cs typeface="Arial" panose="020B0604020202020204" pitchFamily="34" charset="0"/>
+            </a:endParaRPr>
+          </a:p>
+        </p:txBody>
+      </p:sp>
+      <p:sp>
+        <p:nvSpPr>
+          <p:cNvPr id="2" name="Marcador de contenido 1"/>
+          <p:cNvSpPr>
+            <a:spLocks noGrp="1"/>
+          </p:cNvSpPr>
+          <p:nvPr>
+            <p:ph idx="1"/>
+          </p:nvPr>
+        </p:nvSpPr>
+        <p:spPr>
+          <a:xfrm>
+            <a:off x="628650" y="1917052"/>
+            <a:ext cx="7886700" cy="4351338"/>
+          </a:xfrm>
+        </p:spPr>
+        <p:txBody>
+          <a:bodyPr>
+            <a:normAutofit lnSpcReduction="10000"/>
+          </a:bodyPr>
+          <a:lstStyle/>
+          <a:p>
+            <a:pPr marL="0" indent="0">
+              <a:buNone/>
+            </a:pPr>
+            <a:r>
+              <a:rPr lang="es-CO" sz="1800" dirty="0" smtClean="0">
+                <a:latin typeface="Arial" panose="020B0604020202020204" pitchFamily="34" charset="0"/>
+                <a:cs typeface="Arial" panose="020B0604020202020204" pitchFamily="34" charset="0"/>
+              </a:rPr>
+              <a:t>A partir de lo que decía la ISO/IEC 20:</a:t>
+            </a:r>
+          </a:p>
+          <a:p>
+            <a:pPr lvl="0"/>
+            <a:r>
+              <a:rPr lang="es-ES" sz="1800" b="1" dirty="0">
+                <a:latin typeface="Arial" panose="020B0604020202020204" pitchFamily="34" charset="0"/>
+                <a:cs typeface="Arial" panose="020B0604020202020204" pitchFamily="34" charset="0"/>
+              </a:rPr>
+              <a:t>Fase </a:t>
+            </a:r>
+            <a:r>
+              <a:rPr lang="es-ES" sz="1800" b="1" dirty="0" smtClean="0">
+                <a:latin typeface="Arial" panose="020B0604020202020204" pitchFamily="34" charset="0"/>
+                <a:cs typeface="Arial" panose="020B0604020202020204" pitchFamily="34" charset="0"/>
+              </a:rPr>
+              <a:t>2(Ejecución):</a:t>
+            </a:r>
+            <a:r>
+              <a:rPr lang="es-CO" sz="1800" dirty="0" smtClean="0">
+                <a:latin typeface="Arial" panose="020B0604020202020204" pitchFamily="34" charset="0"/>
+                <a:cs typeface="Arial" panose="020B0604020202020204" pitchFamily="34" charset="0"/>
+              </a:rPr>
+              <a:t>Se identifico que en esta fase 2 tenia ciertos artefactos, en la cual fueron necesarios para el seguimiento del proyecto: </a:t>
+            </a:r>
+          </a:p>
+          <a:p>
+            <a:pPr marL="0" lvl="0" indent="0">
+              <a:buNone/>
+            </a:pPr>
+            <a:r>
+              <a:rPr lang="es-CO" sz="1800" b="1" dirty="0">
+                <a:latin typeface="Arial" panose="020B0604020202020204" pitchFamily="34" charset="0"/>
+                <a:cs typeface="Arial" panose="020B0604020202020204" pitchFamily="34" charset="0"/>
+              </a:rPr>
+              <a:t>Acta de la </a:t>
+            </a:r>
+            <a:r>
+              <a:rPr lang="es-CO" sz="1800" b="1" dirty="0" smtClean="0">
+                <a:latin typeface="Arial" panose="020B0604020202020204" pitchFamily="34" charset="0"/>
+                <a:cs typeface="Arial" panose="020B0604020202020204" pitchFamily="34" charset="0"/>
+              </a:rPr>
+              <a:t>reunión</a:t>
+            </a:r>
+            <a:r>
+              <a:rPr lang="es-CO" sz="1800" dirty="0" smtClean="0">
+                <a:latin typeface="Arial" panose="020B0604020202020204" pitchFamily="34" charset="0"/>
+                <a:cs typeface="Arial" panose="020B0604020202020204" pitchFamily="34" charset="0"/>
+              </a:rPr>
+              <a:t>: este artefacto lo consideramos crucial ya que se constataba sobre las reuniones que se realizaron para dialogar con los equipos sobre las tareas que tienen pendiente y sus avances que ha logrado. </a:t>
+            </a:r>
+          </a:p>
+          <a:p>
+            <a:pPr marL="0" indent="0">
+              <a:buNone/>
+            </a:pPr>
+            <a:r>
+              <a:rPr lang="es-CO" sz="1800" b="1" dirty="0">
+                <a:latin typeface="Arial" panose="020B0604020202020204" pitchFamily="34" charset="0"/>
+                <a:cs typeface="Arial" panose="020B0604020202020204" pitchFamily="34" charset="0"/>
+              </a:rPr>
+              <a:t>Registro de estado de </a:t>
+            </a:r>
+            <a:r>
+              <a:rPr lang="es-CO" sz="1800" b="1" dirty="0" smtClean="0">
+                <a:latin typeface="Arial" panose="020B0604020202020204" pitchFamily="34" charset="0"/>
+                <a:cs typeface="Arial" panose="020B0604020202020204" pitchFamily="34" charset="0"/>
+              </a:rPr>
+              <a:t>progreso: </a:t>
+            </a:r>
+            <a:r>
+              <a:rPr lang="es-CO" sz="1800" dirty="0" smtClean="0">
+                <a:latin typeface="Arial" panose="020B0604020202020204" pitchFamily="34" charset="0"/>
+                <a:cs typeface="Arial" panose="020B0604020202020204" pitchFamily="34" charset="0"/>
+              </a:rPr>
+              <a:t>este artefacto fue muy crucial ya que permitió tener un seguimiento a los equipos(Desarrollo y </a:t>
+            </a:r>
+            <a:r>
+              <a:rPr lang="es-CO" sz="1800" dirty="0">
+                <a:latin typeface="Arial" panose="020B0604020202020204" pitchFamily="34" charset="0"/>
+                <a:cs typeface="Arial" panose="020B0604020202020204" pitchFamily="34" charset="0"/>
+              </a:rPr>
+              <a:t>C</a:t>
+            </a:r>
+            <a:r>
+              <a:rPr lang="es-CO" sz="1800" dirty="0" smtClean="0">
+                <a:latin typeface="Arial" panose="020B0604020202020204" pitchFamily="34" charset="0"/>
+                <a:cs typeface="Arial" panose="020B0604020202020204" pitchFamily="34" charset="0"/>
+              </a:rPr>
+              <a:t>alidad), sobre sus entregas de las tareas que tenían asignados y así poder llevar un control y poder dialogar con el equipo atrasado para ponerse al día con sus tarea pendientes</a:t>
+            </a:r>
+          </a:p>
+          <a:p>
+            <a:pPr marL="0" lvl="0" indent="0">
+              <a:buNone/>
+            </a:pPr>
+            <a:r>
+              <a:rPr lang="es-CO" sz="1800" b="1" dirty="0">
+                <a:latin typeface="Arial" panose="020B0604020202020204" pitchFamily="34" charset="0"/>
+                <a:cs typeface="Arial" panose="020B0604020202020204" pitchFamily="34" charset="0"/>
+              </a:rPr>
+              <a:t>Solicitud de </a:t>
+            </a:r>
+            <a:r>
+              <a:rPr lang="es-CO" sz="1800" b="1" dirty="0" smtClean="0">
+                <a:latin typeface="Arial" panose="020B0604020202020204" pitchFamily="34" charset="0"/>
+                <a:cs typeface="Arial" panose="020B0604020202020204" pitchFamily="34" charset="0"/>
+              </a:rPr>
+              <a:t>cambio: </a:t>
+            </a:r>
+            <a:r>
+              <a:rPr lang="es-CO" sz="1800" dirty="0" smtClean="0">
+                <a:latin typeface="Arial" panose="020B0604020202020204" pitchFamily="34" charset="0"/>
+                <a:cs typeface="Arial" panose="020B0604020202020204" pitchFamily="34" charset="0"/>
+              </a:rPr>
+              <a:t>este artefacto también fue muy crucial ya que atreves de como iba avanzando el proyecto, los equipo se pedía cambios para poder ejecutar unos cambios que afectaban el desarrollo de las actividades.</a:t>
+            </a:r>
+            <a:endParaRPr lang="es-CO" sz="1800" dirty="0">
+              <a:latin typeface="Arial" panose="020B0604020202020204" pitchFamily="34" charset="0"/>
+              <a:cs typeface="Arial" panose="020B0604020202020204" pitchFamily="34" charset="0"/>
+            </a:endParaRPr>
+          </a:p>
+          <a:p>
+            <a:pPr marL="0" indent="0">
+              <a:buNone/>
+            </a:pPr>
+            <a:endParaRPr lang="es-CO" sz="1800" dirty="0">
+              <a:latin typeface="Arial" panose="020B0604020202020204" pitchFamily="34" charset="0"/>
+              <a:cs typeface="Arial" panose="020B0604020202020204" pitchFamily="34" charset="0"/>
+            </a:endParaRPr>
+          </a:p>
+          <a:p>
+            <a:pPr marL="0" indent="0">
+              <a:buNone/>
+            </a:pPr>
+            <a:endParaRPr lang="es-CO" sz="1800" dirty="0" smtClean="0">
+              <a:latin typeface="Arial" panose="020B0604020202020204" pitchFamily="34" charset="0"/>
+              <a:cs typeface="Arial" panose="020B0604020202020204" pitchFamily="34" charset="0"/>
+            </a:endParaRPr>
+          </a:p>
+          <a:p>
+            <a:pPr marL="0" indent="0">
+              <a:buNone/>
+            </a:pPr>
+            <a:endParaRPr lang="es-CO" sz="1800" dirty="0">
+              <a:latin typeface="Arial" panose="020B0604020202020204" pitchFamily="34" charset="0"/>
+              <a:cs typeface="Arial" panose="020B0604020202020204" pitchFamily="34" charset="0"/>
+            </a:endParaRPr>
+          </a:p>
+        </p:txBody>
+      </p:sp>
+    </p:spTree>
+    <p:extLst>
+      <p:ext uri="{BB962C8B-B14F-4D97-AF65-F5344CB8AC3E}">
+        <p14:creationId xmlns:p14="http://schemas.microsoft.com/office/powerpoint/2010/main" val="2651804342"/>
+      </p:ext>
+    </p:extLst>
+  </p:cSld>
+  <p:clrMapOvr>
+    <a:masterClrMapping/>
+  </p:clrMapOvr>
+</p:sld>
+</file>
+
+<file path=ppt/slides/slide11.xml><?xml version="1.0" encoding="utf-8"?>
+<p:sld xmlns:a="http://schemas.openxmlformats.org/drawingml/2006/main" xmlns:r="http://schemas.openxmlformats.org/officeDocument/2006/relationships" xmlns:p="http://schemas.openxmlformats.org/presentationml/2006/main">
+  <p:cSld>
+    <p:bg>
+      <p:bgPr>
+        <a:blipFill rotWithShape="1">
+          <a:blip r:embed="rId2"/>
+          <a:stretch>
+            <a:fillRect/>
+          </a:stretch>
+        </a:blipFill>
+        <a:effectLst/>
+      </p:bgPr>
+    </p:bg>
+    <p:spTree>
+      <p:nvGrpSpPr>
+        <p:cNvPr id="1" name=""/>
+        <p:cNvGrpSpPr/>
+        <p:nvPr/>
+      </p:nvGrpSpPr>
+      <p:grpSpPr>
+        <a:xfrm>
+          <a:off x="0" y="0"/>
+          <a:ext cx="0" cy="0"/>
+          <a:chOff x="0" y="0"/>
+          <a:chExt cx="0" cy="0"/>
+        </a:xfrm>
+      </p:grpSpPr>
+      <p:sp>
+        <p:nvSpPr>
+          <p:cNvPr id="6" name="Título 5"/>
+          <p:cNvSpPr>
+            <a:spLocks noGrp="1"/>
+          </p:cNvSpPr>
+          <p:nvPr>
+            <p:ph type="title"/>
+          </p:nvPr>
+        </p:nvSpPr>
+        <p:spPr>
+          <a:xfrm>
+            <a:off x="2056147" y="589610"/>
+            <a:ext cx="6848788" cy="768477"/>
+          </a:xfrm>
+        </p:spPr>
+        <p:txBody>
+          <a:bodyPr>
+            <a:normAutofit/>
+          </a:bodyPr>
+          <a:lstStyle/>
+          <a:p>
+            <a:r>
+              <a:rPr lang="es-ES" sz="2500" b="1" dirty="0" smtClean="0">
+                <a:solidFill>
+                  <a:schemeClr val="bg1"/>
+                </a:solidFill>
+                <a:latin typeface="Arial" panose="020B0604020202020204" pitchFamily="34" charset="0"/>
+                <a:cs typeface="Arial" panose="020B0604020202020204" pitchFamily="34" charset="0"/>
+              </a:rPr>
+              <a:t>Recomendaciones</a:t>
+            </a:r>
+            <a:endParaRPr lang="es-ES" sz="2500" b="1" dirty="0">
+              <a:solidFill>
+                <a:schemeClr val="bg1"/>
+              </a:solidFill>
+              <a:latin typeface="Arial" panose="020B0604020202020204" pitchFamily="34" charset="0"/>
+              <a:cs typeface="Arial" panose="020B0604020202020204" pitchFamily="34" charset="0"/>
+            </a:endParaRPr>
+          </a:p>
+        </p:txBody>
+      </p:sp>
+      <p:sp>
+        <p:nvSpPr>
+          <p:cNvPr id="2" name="Marcador de contenido 1"/>
+          <p:cNvSpPr>
+            <a:spLocks noGrp="1"/>
+          </p:cNvSpPr>
+          <p:nvPr>
+            <p:ph idx="1"/>
+          </p:nvPr>
+        </p:nvSpPr>
+        <p:spPr>
+          <a:xfrm>
+            <a:off x="628650" y="1917052"/>
+            <a:ext cx="7886700" cy="4351338"/>
+          </a:xfrm>
+        </p:spPr>
+        <p:txBody>
+          <a:bodyPr>
+            <a:normAutofit/>
+          </a:bodyPr>
+          <a:lstStyle/>
+          <a:p>
+            <a:pPr marL="0" indent="0">
+              <a:buNone/>
+            </a:pPr>
+            <a:r>
+              <a:rPr lang="es-CO" sz="1800" dirty="0" smtClean="0">
+                <a:latin typeface="Arial" panose="020B0604020202020204" pitchFamily="34" charset="0"/>
+                <a:cs typeface="Arial" panose="020B0604020202020204" pitchFamily="34" charset="0"/>
+              </a:rPr>
+              <a:t>A partir de lo que decía la ISO/IEC 20:</a:t>
+            </a:r>
+          </a:p>
+          <a:p>
+            <a:r>
+              <a:rPr lang="es-ES" sz="1800" b="1" smtClean="0">
+                <a:latin typeface="Arial" panose="020B0604020202020204" pitchFamily="34" charset="0"/>
+                <a:cs typeface="Arial" panose="020B0604020202020204" pitchFamily="34" charset="0"/>
+              </a:rPr>
+              <a:t>Fase 3(Evaluación </a:t>
+            </a:r>
+            <a:r>
+              <a:rPr lang="es-ES" sz="1800" b="1">
+                <a:latin typeface="Arial" panose="020B0604020202020204" pitchFamily="34" charset="0"/>
+                <a:cs typeface="Arial" panose="020B0604020202020204" pitchFamily="34" charset="0"/>
+              </a:rPr>
+              <a:t>y </a:t>
+            </a:r>
+            <a:r>
+              <a:rPr lang="es-ES" sz="1800" b="1" smtClean="0">
+                <a:latin typeface="Arial" panose="020B0604020202020204" pitchFamily="34" charset="0"/>
+                <a:cs typeface="Arial" panose="020B0604020202020204" pitchFamily="34" charset="0"/>
+              </a:rPr>
+              <a:t>control):</a:t>
+            </a:r>
+            <a:r>
+              <a:rPr lang="es-CO" sz="1800" dirty="0" smtClean="0">
+                <a:latin typeface="Arial" panose="020B0604020202020204" pitchFamily="34" charset="0"/>
+                <a:cs typeface="Arial" panose="020B0604020202020204" pitchFamily="34" charset="0"/>
+              </a:rPr>
+              <a:t>Se identifico que en esta fase 3 tenia un solo  artefactos, en la cual fueron necesarios para el seguimiento del proyecto: </a:t>
+            </a:r>
+          </a:p>
+          <a:p>
+            <a:pPr marL="0" indent="0">
+              <a:buNone/>
+            </a:pPr>
+            <a:r>
+              <a:rPr lang="es-CO" sz="1800" b="1" dirty="0">
+                <a:latin typeface="Arial" panose="020B0604020202020204" pitchFamily="34" charset="0"/>
+                <a:cs typeface="Arial" panose="020B0604020202020204" pitchFamily="34" charset="0"/>
+              </a:rPr>
+              <a:t>Registro de </a:t>
+            </a:r>
+            <a:r>
+              <a:rPr lang="es-CO" sz="1800" b="1" dirty="0" smtClean="0">
+                <a:latin typeface="Arial" panose="020B0604020202020204" pitchFamily="34" charset="0"/>
+                <a:cs typeface="Arial" panose="020B0604020202020204" pitchFamily="34" charset="0"/>
+              </a:rPr>
+              <a:t>corrección</a:t>
+            </a:r>
+            <a:r>
+              <a:rPr lang="es-CO" sz="1800" dirty="0" smtClean="0">
+                <a:latin typeface="Arial" panose="020B0604020202020204" pitchFamily="34" charset="0"/>
+                <a:cs typeface="Arial" panose="020B0604020202020204" pitchFamily="34" charset="0"/>
+              </a:rPr>
+              <a:t>: </a:t>
+            </a:r>
+            <a:endParaRPr lang="es-CO" sz="1800" dirty="0">
+              <a:latin typeface="Arial" panose="020B0604020202020204" pitchFamily="34" charset="0"/>
+              <a:cs typeface="Arial" panose="020B0604020202020204" pitchFamily="34" charset="0"/>
+            </a:endParaRPr>
+          </a:p>
+          <a:p>
+            <a:pPr marL="0" indent="0">
+              <a:buNone/>
+            </a:pPr>
+            <a:endParaRPr lang="es-CO" sz="1800" dirty="0" smtClean="0">
+              <a:latin typeface="Arial" panose="020B0604020202020204" pitchFamily="34" charset="0"/>
+              <a:cs typeface="Arial" panose="020B0604020202020204" pitchFamily="34" charset="0"/>
+            </a:endParaRPr>
+          </a:p>
+          <a:p>
+            <a:pPr marL="0" indent="0">
+              <a:buNone/>
+            </a:pPr>
+            <a:endParaRPr lang="es-CO" sz="1800" dirty="0">
+              <a:latin typeface="Arial" panose="020B0604020202020204" pitchFamily="34" charset="0"/>
+              <a:cs typeface="Arial" panose="020B0604020202020204" pitchFamily="34" charset="0"/>
+            </a:endParaRPr>
+          </a:p>
+        </p:txBody>
+      </p:sp>
+    </p:spTree>
+    <p:extLst>
+      <p:ext uri="{BB962C8B-B14F-4D97-AF65-F5344CB8AC3E}">
+        <p14:creationId xmlns:p14="http://schemas.microsoft.com/office/powerpoint/2010/main" val="3626148279"/>
+      </p:ext>
+    </p:extLst>
+  </p:cSld>
+  <p:clrMapOvr>
+    <a:masterClrMapping/>
+  </p:clrMapOvr>
+</p:sld>
+</file>
+
+<file path=ppt/slides/slide12.xml><?xml version="1.0" encoding="utf-8"?>
+<p:sld xmlns:a="http://schemas.openxmlformats.org/drawingml/2006/main" xmlns:r="http://schemas.openxmlformats.org/officeDocument/2006/relationships" xmlns:p="http://schemas.openxmlformats.org/presentationml/2006/main">
+  <p:cSld>
+    <p:bg>
+      <p:bgPr>
+        <a:blipFill rotWithShape="1">
+          <a:blip r:embed="rId2"/>
+          <a:stretch>
+            <a:fillRect/>
+          </a:stretch>
+        </a:blipFill>
+        <a:effectLst/>
+      </p:bgPr>
+    </p:bg>
+    <p:spTree>
+      <p:nvGrpSpPr>
+        <p:cNvPr id="1" name=""/>
+        <p:cNvGrpSpPr/>
+        <p:nvPr/>
+      </p:nvGrpSpPr>
+      <p:grpSpPr>
+        <a:xfrm>
+          <a:off x="0" y="0"/>
+          <a:ext cx="0" cy="0"/>
+          <a:chOff x="0" y="0"/>
+          <a:chExt cx="0" cy="0"/>
+        </a:xfrm>
+      </p:grpSpPr>
+      <p:sp>
+        <p:nvSpPr>
+          <p:cNvPr id="6" name="Título 5"/>
+          <p:cNvSpPr>
+            <a:spLocks noGrp="1"/>
+          </p:cNvSpPr>
+          <p:nvPr>
+            <p:ph type="title"/>
+          </p:nvPr>
+        </p:nvSpPr>
+        <p:spPr>
+          <a:xfrm>
+            <a:off x="2056147" y="589610"/>
+            <a:ext cx="6848788" cy="768477"/>
+          </a:xfrm>
+        </p:spPr>
+        <p:txBody>
+          <a:bodyPr>
+            <a:normAutofit/>
+          </a:bodyPr>
+          <a:lstStyle/>
+          <a:p>
+            <a:r>
+              <a:rPr lang="es-ES" sz="2500" b="1" dirty="0" smtClean="0">
+                <a:solidFill>
+                  <a:schemeClr val="bg1"/>
+                </a:solidFill>
+                <a:latin typeface="Arial" panose="020B0604020202020204" pitchFamily="34" charset="0"/>
+                <a:cs typeface="Arial" panose="020B0604020202020204" pitchFamily="34" charset="0"/>
+              </a:rPr>
+              <a:t>Recomendaciones</a:t>
+            </a:r>
+            <a:endParaRPr lang="es-ES" sz="2500" b="1" dirty="0">
+              <a:solidFill>
+                <a:schemeClr val="bg1"/>
+              </a:solidFill>
+              <a:latin typeface="Arial" panose="020B0604020202020204" pitchFamily="34" charset="0"/>
+              <a:cs typeface="Arial" panose="020B0604020202020204" pitchFamily="34" charset="0"/>
+            </a:endParaRPr>
+          </a:p>
+        </p:txBody>
+      </p:sp>
+      <p:sp>
+        <p:nvSpPr>
+          <p:cNvPr id="2" name="Marcador de contenido 1"/>
+          <p:cNvSpPr>
+            <a:spLocks noGrp="1"/>
+          </p:cNvSpPr>
+          <p:nvPr>
+            <p:ph idx="1"/>
+          </p:nvPr>
+        </p:nvSpPr>
+        <p:spPr>
+          <a:xfrm>
+            <a:off x="628650" y="1917052"/>
+            <a:ext cx="7886700" cy="4351338"/>
+          </a:xfrm>
+        </p:spPr>
+        <p:txBody>
+          <a:bodyPr>
+            <a:normAutofit/>
+          </a:bodyPr>
+          <a:lstStyle/>
+          <a:p>
+            <a:pPr marL="0" indent="0">
+              <a:buNone/>
+            </a:pPr>
+            <a:r>
+              <a:rPr lang="es-CO" sz="1800" dirty="0" smtClean="0">
+                <a:latin typeface="Arial" panose="020B0604020202020204" pitchFamily="34" charset="0"/>
+                <a:cs typeface="Arial" panose="020B0604020202020204" pitchFamily="34" charset="0"/>
+              </a:rPr>
+              <a:t>A partir de lo que decía la ISO/IEC 20:</a:t>
+            </a:r>
+          </a:p>
+          <a:p>
+            <a:pPr lvl="0"/>
+            <a:r>
+              <a:rPr lang="es-ES" sz="1800" b="1" dirty="0">
+                <a:latin typeface="Arial" panose="020B0604020202020204" pitchFamily="34" charset="0"/>
+                <a:cs typeface="Arial" panose="020B0604020202020204" pitchFamily="34" charset="0"/>
+              </a:rPr>
+              <a:t>Fase </a:t>
+            </a:r>
+            <a:r>
+              <a:rPr lang="es-ES" sz="1800" b="1" dirty="0" smtClean="0">
+                <a:latin typeface="Arial" panose="020B0604020202020204" pitchFamily="34" charset="0"/>
+                <a:cs typeface="Arial" panose="020B0604020202020204" pitchFamily="34" charset="0"/>
+              </a:rPr>
+              <a:t>4(cierre):</a:t>
+            </a:r>
+            <a:r>
+              <a:rPr lang="es-CO" sz="1800" dirty="0" smtClean="0">
+                <a:latin typeface="Arial" panose="020B0604020202020204" pitchFamily="34" charset="0"/>
+                <a:cs typeface="Arial" panose="020B0604020202020204" pitchFamily="34" charset="0"/>
+              </a:rPr>
+              <a:t>Se identifico que en esta fase 4 tenia un solo  artefactos, </a:t>
+            </a:r>
+            <a:r>
+              <a:rPr lang="es-CO" sz="1800" b="1" dirty="0">
+                <a:latin typeface="Arial" panose="020B0604020202020204" pitchFamily="34" charset="0"/>
+                <a:cs typeface="Arial" panose="020B0604020202020204" pitchFamily="34" charset="0"/>
+              </a:rPr>
+              <a:t>Registro de </a:t>
+            </a:r>
+            <a:r>
+              <a:rPr lang="es-CO" sz="1800" b="1" dirty="0" smtClean="0">
+                <a:latin typeface="Arial" panose="020B0604020202020204" pitchFamily="34" charset="0"/>
+                <a:cs typeface="Arial" panose="020B0604020202020204" pitchFamily="34" charset="0"/>
+              </a:rPr>
+              <a:t>aceptación: </a:t>
+            </a:r>
+            <a:r>
+              <a:rPr lang="es-CO" sz="1800" dirty="0" smtClean="0">
+                <a:latin typeface="Arial" panose="020B0604020202020204" pitchFamily="34" charset="0"/>
+                <a:cs typeface="Arial" panose="020B0604020202020204" pitchFamily="34" charset="0"/>
+              </a:rPr>
+              <a:t>Este artefacto no se ha ejecutado ya que todavía no se ha terminado con todas la tareas</a:t>
+            </a:r>
+            <a:endParaRPr lang="es-ES" sz="1800" dirty="0">
+              <a:latin typeface="Arial" panose="020B0604020202020204" pitchFamily="34" charset="0"/>
+              <a:cs typeface="Arial" panose="020B0604020202020204" pitchFamily="34" charset="0"/>
+            </a:endParaRPr>
+          </a:p>
+          <a:p>
+            <a:pPr marL="0" indent="0">
+              <a:buNone/>
+            </a:pPr>
+            <a:endParaRPr lang="es-CO" sz="1800" dirty="0" smtClean="0">
+              <a:latin typeface="Arial" panose="020B0604020202020204" pitchFamily="34" charset="0"/>
+              <a:cs typeface="Arial" panose="020B0604020202020204" pitchFamily="34" charset="0"/>
+            </a:endParaRPr>
+          </a:p>
+          <a:p>
+            <a:pPr marL="0" indent="0">
+              <a:buNone/>
+            </a:pPr>
+            <a:endParaRPr lang="es-CO" sz="1800" dirty="0">
+              <a:latin typeface="Arial" panose="020B0604020202020204" pitchFamily="34" charset="0"/>
+              <a:cs typeface="Arial" panose="020B0604020202020204" pitchFamily="34" charset="0"/>
+            </a:endParaRPr>
+          </a:p>
+        </p:txBody>
+      </p:sp>
+    </p:spTree>
+    <p:extLst>
+      <p:ext uri="{BB962C8B-B14F-4D97-AF65-F5344CB8AC3E}">
+        <p14:creationId xmlns:p14="http://schemas.microsoft.com/office/powerpoint/2010/main" val="1617998195"/>
+      </p:ext>
+    </p:extLst>
+  </p:cSld>
+  <p:clrMapOvr>
+    <a:masterClrMapping/>
+  </p:clrMapOvr>
+</p:sld>
+</file>
+
+<file path=ppt/slides/slide13.xml><?xml version="1.0" encoding="utf-8"?>
+<p:sld xmlns:a="http://schemas.openxmlformats.org/drawingml/2006/main" xmlns:r="http://schemas.openxmlformats.org/officeDocument/2006/relationships" xmlns:p="http://schemas.openxmlformats.org/presentationml/2006/main">
+  <p:cSld>
+    <p:bg>
+      <p:bgPr>
+        <a:blipFill rotWithShape="1">
+          <a:blip r:embed="rId2"/>
+          <a:stretch>
+            <a:fillRect/>
+          </a:stretch>
+        </a:blipFill>
+        <a:effectLst/>
+      </p:bgPr>
+    </p:bg>
+    <p:spTree>
+      <p:nvGrpSpPr>
+        <p:cNvPr id="1" name=""/>
+        <p:cNvGrpSpPr/>
+        <p:nvPr/>
+      </p:nvGrpSpPr>
+      <p:grpSpPr>
+        <a:xfrm>
+          <a:off x="0" y="0"/>
+          <a:ext cx="0" cy="0"/>
+          <a:chOff x="0" y="0"/>
+          <a:chExt cx="0" cy="0"/>
+        </a:xfrm>
+      </p:grpSpPr>
+      <p:sp>
+        <p:nvSpPr>
+          <p:cNvPr id="6" name="Título 5"/>
+          <p:cNvSpPr>
+            <a:spLocks noGrp="1"/>
+          </p:cNvSpPr>
+          <p:nvPr>
+            <p:ph type="title"/>
+          </p:nvPr>
+        </p:nvSpPr>
+        <p:spPr>
+          <a:xfrm>
+            <a:off x="2056147" y="589610"/>
+            <a:ext cx="6848788" cy="768477"/>
+          </a:xfrm>
+        </p:spPr>
+        <p:txBody>
+          <a:bodyPr>
+            <a:normAutofit/>
+          </a:bodyPr>
+          <a:lstStyle/>
+          <a:p>
+            <a:r>
+              <a:rPr lang="es-CO" sz="2500" b="1" dirty="0">
+                <a:solidFill>
+                  <a:schemeClr val="bg1"/>
+                </a:solidFill>
+                <a:latin typeface="Arial" panose="020B0604020202020204" pitchFamily="34" charset="0"/>
+                <a:cs typeface="Arial" panose="020B0604020202020204" pitchFamily="34" charset="0"/>
+              </a:rPr>
+              <a:t>7. Conclusiones</a:t>
+            </a:r>
+            <a:endParaRPr lang="es-ES" sz="2500" b="1" dirty="0">
+              <a:solidFill>
+                <a:schemeClr val="bg1"/>
+              </a:solidFill>
+              <a:latin typeface="Arial" panose="020B0604020202020204" pitchFamily="34" charset="0"/>
+              <a:cs typeface="Arial" panose="020B0604020202020204" pitchFamily="34" charset="0"/>
+            </a:endParaRPr>
+          </a:p>
+        </p:txBody>
+      </p:sp>
+      <p:sp>
+        <p:nvSpPr>
+          <p:cNvPr id="2" name="Marcador de contenido 1"/>
+          <p:cNvSpPr>
+            <a:spLocks noGrp="1"/>
+          </p:cNvSpPr>
+          <p:nvPr>
+            <p:ph idx="1"/>
+          </p:nvPr>
+        </p:nvSpPr>
+        <p:spPr>
+          <a:xfrm>
+            <a:off x="628650" y="1917052"/>
+            <a:ext cx="7886700" cy="4351338"/>
+          </a:xfrm>
+        </p:spPr>
+        <p:txBody>
+          <a:bodyPr>
+            <a:normAutofit fontScale="62500" lnSpcReduction="20000"/>
+          </a:bodyPr>
+          <a:lstStyle/>
+          <a:p>
+            <a:r>
+              <a:rPr lang="es-CO" dirty="0">
+                <a:latin typeface="Arial" panose="020B0604020202020204" pitchFamily="34" charset="0"/>
+                <a:cs typeface="Arial" panose="020B0604020202020204" pitchFamily="34" charset="0"/>
+              </a:rPr>
+              <a:t>La ISO/IEC 29110 como base para la elaboración de este diseño fue de gran apoyo, puesto que proporcionó los pasos y artefactos necesarios para llevar a cabo el seguimiento y control adecuado de todos los recursos que intervinieron en el proyecto.</a:t>
+            </a:r>
+          </a:p>
+          <a:p>
+            <a:r>
+              <a:rPr lang="es-CO" dirty="0">
+                <a:latin typeface="Arial" panose="020B0604020202020204" pitchFamily="34" charset="0"/>
+                <a:cs typeface="Arial" panose="020B0604020202020204" pitchFamily="34" charset="0"/>
+              </a:rPr>
+              <a:t>A lo largo del seguimiento y control del proyecto de la empresa Sanambiente, se han evidenciado algunos contratiempos en tema de entrega de tareas por parte de los equipos, ya sea porque carecían de conocimientos para realizarlas y tuvieron que apartar un tiempo para saber cómo se hacían, o dependían de otras tareas de otro equipo para poder ejecutar las suyas. En este caso se optó por tomar un plan de contingencia que consistía en adecuar las fechas de entrega de las tareas de cada equipo, de manera que no causaran contratiempo alguno a aquellos que estaban implicados en estas.</a:t>
+            </a:r>
+          </a:p>
+          <a:p>
+            <a:r>
+              <a:rPr lang="es-CO" dirty="0">
+                <a:latin typeface="Arial" panose="020B0604020202020204" pitchFamily="34" charset="0"/>
+                <a:cs typeface="Arial" panose="020B0604020202020204" pitchFamily="34" charset="0"/>
+              </a:rPr>
+              <a:t>El estándar ISO/IEC 29110 ayuda a las VSE de software a mejorar la calidad de sus productos y/o servicios y el rendimiento de sus procesos, proporcionando los lineamientos idóneos para que estas los apliquen sin problemas sobre cualquier proyecto que posean.</a:t>
+            </a:r>
+          </a:p>
+          <a:p>
+            <a:endParaRPr lang="es-CO" u="sng" dirty="0">
+              <a:latin typeface="Arial" panose="020B0604020202020204" pitchFamily="34" charset="0"/>
+              <a:cs typeface="Arial" panose="020B0604020202020204" pitchFamily="34" charset="0"/>
+            </a:endParaRPr>
+          </a:p>
+        </p:txBody>
+      </p:sp>
+    </p:spTree>
+    <p:extLst>
+      <p:ext uri="{BB962C8B-B14F-4D97-AF65-F5344CB8AC3E}">
+        <p14:creationId xmlns:p14="http://schemas.microsoft.com/office/powerpoint/2010/main" val="2238978106"/>
+      </p:ext>
+    </p:extLst>
+  </p:cSld>
+  <p:clrMapOvr>
+    <a:masterClrMapping/>
+  </p:clrMapOvr>
+</p:sld>
+</file>
+
+<file path=ppt/slides/slide14.xml><?xml version="1.0" encoding="utf-8"?>
+<p:sld xmlns:a="http://schemas.openxmlformats.org/drawingml/2006/main" xmlns:r="http://schemas.openxmlformats.org/officeDocument/2006/relationships" xmlns:p="http://schemas.openxmlformats.org/presentationml/2006/main">
+  <p:cSld>
+    <p:bg>
+      <p:bgPr>
+        <a:blipFill rotWithShape="1">
+          <a:blip r:embed="rId2"/>
+          <a:stretch>
+            <a:fillRect/>
+          </a:stretch>
+        </a:blipFill>
+        <a:effectLst/>
+      </p:bgPr>
+    </p:bg>
+    <p:spTree>
+      <p:nvGrpSpPr>
+        <p:cNvPr id="1" name=""/>
+        <p:cNvGrpSpPr/>
+        <p:nvPr/>
+      </p:nvGrpSpPr>
+      <p:grpSpPr>
+        <a:xfrm>
+          <a:off x="0" y="0"/>
+          <a:ext cx="0" cy="0"/>
+          <a:chOff x="0" y="0"/>
+          <a:chExt cx="0" cy="0"/>
+        </a:xfrm>
+      </p:grpSpPr>
+      <p:sp>
+        <p:nvSpPr>
+          <p:cNvPr id="6" name="Título 5"/>
+          <p:cNvSpPr>
+            <a:spLocks noGrp="1"/>
+          </p:cNvSpPr>
+          <p:nvPr>
+            <p:ph type="title"/>
+          </p:nvPr>
+        </p:nvSpPr>
+        <p:spPr>
+          <a:xfrm>
+            <a:off x="2056147" y="589610"/>
+            <a:ext cx="6848788" cy="768477"/>
+          </a:xfrm>
+        </p:spPr>
+        <p:txBody>
+          <a:bodyPr>
+            <a:normAutofit/>
+          </a:bodyPr>
+          <a:lstStyle/>
+          <a:p>
+            <a:r>
               <a:rPr lang="es-CO" sz="2500" b="1" dirty="0">
                 <a:solidFill>
                   <a:schemeClr val="bg1"/>
@@ -7502,7 +8413,7 @@
 </p:sld>
 </file>
 
-<file path=ppt/slides/slide11.xml><?xml version="1.0" encoding="utf-8"?>
+<file path=ppt/slides/slide15.xml><?xml version="1.0" encoding="utf-8"?>
 <p:sld xmlns:a="http://schemas.openxmlformats.org/drawingml/2006/main" xmlns:r="http://schemas.openxmlformats.org/officeDocument/2006/relationships" xmlns:p="http://schemas.openxmlformats.org/presentationml/2006/main">
   <p:cSld>
     <p:bg>
@@ -7579,7 +8490,7 @@
 </p:sld>
 </file>
 
-<file path=ppt/slides/slide12.xml><?xml version="1.0" encoding="utf-8"?>
+<file path=ppt/slides/slide16.xml><?xml version="1.0" encoding="utf-8"?>
 <p:sld xmlns:a="http://schemas.openxmlformats.org/drawingml/2006/main" xmlns:r="http://schemas.openxmlformats.org/officeDocument/2006/relationships" xmlns:p="http://schemas.openxmlformats.org/presentationml/2006/main">
   <p:cSld>
     <p:bg>
@@ -7681,6 +8592,16 @@
               </a:rPr>
               <a:t>Diseño de un marco de trabajo siguiendo la ISO/IEC 29110 para el proyecto de la empresa Sanambiente </a:t>
             </a:r>
+            <a:r>
+              <a:rPr lang="es-MX" sz="2500" b="1" dirty="0">
+                <a:solidFill>
+                  <a:schemeClr val="bg1"/>
+                </a:solidFill>
+                <a:latin typeface="Arial" panose="020B0604020202020204" pitchFamily="34" charset="0"/>
+                <a:cs typeface="Arial" panose="020B0604020202020204" pitchFamily="34" charset="0"/>
+              </a:rPr>
+              <a:t/>
+            </a:r>
             <a:br>
               <a:rPr lang="es-MX" sz="2500" b="1" dirty="0">
                 <a:solidFill>
@@ -7690,6 +8611,16 @@
                 <a:cs typeface="Arial" panose="020B0604020202020204" pitchFamily="34" charset="0"/>
               </a:rPr>
             </a:br>
+            <a:r>
+              <a:rPr lang="es-MX" sz="2500" b="1" dirty="0">
+                <a:solidFill>
+                  <a:schemeClr val="bg1"/>
+                </a:solidFill>
+                <a:latin typeface="Arial" panose="020B0604020202020204" pitchFamily="34" charset="0"/>
+                <a:cs typeface="Arial" panose="020B0604020202020204" pitchFamily="34" charset="0"/>
+              </a:rPr>
+              <a:t/>
+            </a:r>
             <a:br>
               <a:rPr lang="es-MX" sz="2500" b="1" dirty="0">
                 <a:solidFill>
@@ -7699,6 +8630,16 @@
                 <a:cs typeface="Arial" panose="020B0604020202020204" pitchFamily="34" charset="0"/>
               </a:rPr>
             </a:br>
+            <a:r>
+              <a:rPr lang="es-ES" sz="2500" b="1" dirty="0">
+                <a:solidFill>
+                  <a:schemeClr val="bg1"/>
+                </a:solidFill>
+                <a:latin typeface="Arial" panose="020B0604020202020204" pitchFamily="34" charset="0"/>
+                <a:cs typeface="Arial" panose="020B0604020202020204" pitchFamily="34" charset="0"/>
+              </a:rPr>
+              <a:t/>
+            </a:r>
             <a:br>
               <a:rPr lang="es-ES" sz="2500" b="1" dirty="0">
                 <a:solidFill>
@@ -7718,6 +8659,16 @@
               </a:rPr>
               <a:t>Integrantes:</a:t>
             </a:r>
+            <a:r>
+              <a:rPr lang="es-ES" sz="2500" dirty="0">
+                <a:solidFill>
+                  <a:schemeClr val="bg1"/>
+                </a:solidFill>
+                <a:latin typeface="Arial" panose="020B0604020202020204" pitchFamily="34" charset="0"/>
+                <a:cs typeface="Arial" panose="020B0604020202020204" pitchFamily="34" charset="0"/>
+              </a:rPr>
+              <a:t/>
+            </a:r>
             <a:br>
               <a:rPr lang="es-ES" sz="2500" dirty="0">
                 <a:solidFill>
@@ -7765,6 +8716,16 @@
                 <a:cs typeface="Arial" panose="020B0604020202020204" pitchFamily="34" charset="0"/>
               </a:rPr>
             </a:br>
+            <a:r>
+              <a:rPr lang="es-ES" sz="2500" dirty="0">
+                <a:solidFill>
+                  <a:schemeClr val="bg1"/>
+                </a:solidFill>
+                <a:latin typeface="Arial" panose="020B0604020202020204" pitchFamily="34" charset="0"/>
+                <a:cs typeface="Arial" panose="020B0604020202020204" pitchFamily="34" charset="0"/>
+              </a:rPr>
+              <a:t/>
+            </a:r>
             <a:br>
               <a:rPr lang="es-ES" sz="2500" dirty="0">
                 <a:solidFill>
@@ -7774,6 +8735,16 @@
                 <a:cs typeface="Arial" panose="020B0604020202020204" pitchFamily="34" charset="0"/>
               </a:rPr>
             </a:br>
+            <a:r>
+              <a:rPr lang="es-ES" sz="2500" dirty="0">
+                <a:solidFill>
+                  <a:schemeClr val="bg1"/>
+                </a:solidFill>
+                <a:latin typeface="Arial" panose="020B0604020202020204" pitchFamily="34" charset="0"/>
+                <a:cs typeface="Arial" panose="020B0604020202020204" pitchFamily="34" charset="0"/>
+              </a:rPr>
+              <a:t/>
+            </a:r>
             <a:br>
               <a:rPr lang="es-ES" sz="2500" dirty="0">
                 <a:solidFill>
@@ -7822,6 +8793,16 @@
               </a:rPr>
               <a:t>Beatriz E. Marín</a:t>
             </a:r>
+            <a:r>
+              <a:rPr lang="es-CO" sz="2500" b="1" dirty="0">
+                <a:solidFill>
+                  <a:schemeClr val="bg1"/>
+                </a:solidFill>
+                <a:latin typeface="Arial" panose="020B0604020202020204" pitchFamily="34" charset="0"/>
+                <a:cs typeface="Arial" panose="020B0604020202020204" pitchFamily="34" charset="0"/>
+              </a:rPr>
+              <a:t/>
+            </a:r>
             <a:br>
               <a:rPr lang="es-CO" sz="2500" b="1" dirty="0">
                 <a:solidFill>
@@ -7831,6 +8812,16 @@
                 <a:cs typeface="Arial" panose="020B0604020202020204" pitchFamily="34" charset="0"/>
               </a:rPr>
             </a:br>
+            <a:r>
+              <a:rPr lang="es-ES" sz="2500" dirty="0">
+                <a:solidFill>
+                  <a:schemeClr val="bg1"/>
+                </a:solidFill>
+                <a:latin typeface="Arial" panose="020B0604020202020204" pitchFamily="34" charset="0"/>
+                <a:cs typeface="Arial" panose="020B0604020202020204" pitchFamily="34" charset="0"/>
+              </a:rPr>
+              <a:t/>
+            </a:r>
             <a:br>
               <a:rPr lang="es-ES" sz="2500" dirty="0">
                 <a:solidFill>
@@ -9934,14 +10925,14 @@
           <a:lstStyle/>
           <a:p>
             <a:r>
-              <a:rPr lang="es-CO" sz="2500" b="1" dirty="0">
+              <a:rPr lang="es-ES" sz="2500" b="1" dirty="0" smtClean="0">
                 <a:solidFill>
                   <a:schemeClr val="bg1"/>
                 </a:solidFill>
                 <a:latin typeface="Arial" panose="020B0604020202020204" pitchFamily="34" charset="0"/>
                 <a:cs typeface="Arial" panose="020B0604020202020204" pitchFamily="34" charset="0"/>
               </a:rPr>
-              <a:t>7. Conclusiones</a:t>
+              <a:t>Recomendaciones</a:t>
             </a:r>
             <a:endParaRPr lang="es-ES" sz="2500" b="1" dirty="0">
               <a:solidFill>
@@ -9971,38 +10962,124 @@
         </p:spPr>
         <p:txBody>
           <a:bodyPr>
-            <a:normAutofit fontScale="62500" lnSpcReduction="20000"/>
+            <a:normAutofit/>
           </a:bodyPr>
           <a:lstStyle/>
           <a:p>
-            <a:r>
-              <a:rPr lang="es-CO" dirty="0">
+            <a:pPr marL="0" indent="0">
+              <a:buNone/>
+            </a:pPr>
+            <a:r>
+              <a:rPr lang="es-CO" sz="1800" dirty="0" smtClean="0">
                 <a:latin typeface="Arial" panose="020B0604020202020204" pitchFamily="34" charset="0"/>
                 <a:cs typeface="Arial" panose="020B0604020202020204" pitchFamily="34" charset="0"/>
               </a:rPr>
-              <a:t>La ISO/IEC 29110 como base para la elaboración de este diseño fue de gran apoyo, puesto que proporcionó los pasos y artefactos necesarios para llevar a cabo el seguimiento y control adecuado de todos los recursos que intervinieron en el proyecto.</a:t>
-            </a:r>
-          </a:p>
-          <a:p>
-            <a:r>
-              <a:rPr lang="es-CO" dirty="0">
+              <a:t>A partir de lo que decía la ISO/IEC 20:</a:t>
+            </a:r>
+          </a:p>
+          <a:p>
+            <a:pPr marL="0" indent="0">
+              <a:buNone/>
+            </a:pPr>
+            <a:r>
+              <a:rPr lang="es-CO" sz="1800" b="1" dirty="0" smtClean="0">
                 <a:latin typeface="Arial" panose="020B0604020202020204" pitchFamily="34" charset="0"/>
                 <a:cs typeface="Arial" panose="020B0604020202020204" pitchFamily="34" charset="0"/>
               </a:rPr>
-              <a:t>A lo largo del seguimiento y control del proyecto de la empresa Sanambiente, se han evidenciado algunos contratiempos en tema de entrega de tareas por parte de los equipos, ya sea porque carecían de conocimientos para realizarlas y tuvieron que apartar un tiempo para saber cómo se hacían, o dependían de otras tareas de otro equipo para poder ejecutar las suyas. En este caso se optó por tomar un plan de contingencia que consistía en adecuar las fechas de entrega de las tareas de cada equipo, de manera que no causaran contratiempo alguno a aquellos que estaban implicados en estas.</a:t>
-            </a:r>
-          </a:p>
-          <a:p>
-            <a:r>
-              <a:rPr lang="es-CO" dirty="0">
+              <a:t>FASE</a:t>
+            </a:r>
+            <a:r>
+              <a:rPr lang="es-CO" sz="1800" dirty="0" smtClean="0">
                 <a:latin typeface="Arial" panose="020B0604020202020204" pitchFamily="34" charset="0"/>
                 <a:cs typeface="Arial" panose="020B0604020202020204" pitchFamily="34" charset="0"/>
               </a:rPr>
-              <a:t>El estándar ISO/IEC 29110 ayuda a las VSE de software a mejorar la calidad de sus productos y/o servicios y el rendimiento de sus procesos, proporcionando los lineamientos idóneos para que estas los apliquen sin problemas sobre cualquier proyecto que posean.</a:t>
-            </a:r>
-          </a:p>
-          <a:p>
-            <a:endParaRPr lang="es-CO" u="sng" dirty="0">
+              <a:t> 1(planificación): Se identifico que en esta fase 1 tenia ciertos artefactos, en la cual fueron necesarios para el seguimiento del proyecto: </a:t>
+            </a:r>
+            <a:r>
+              <a:rPr lang="es-CO" sz="1800" b="1" dirty="0" smtClean="0">
+                <a:latin typeface="Arial" panose="020B0604020202020204" pitchFamily="34" charset="0"/>
+                <a:cs typeface="Arial" panose="020B0604020202020204" pitchFamily="34" charset="0"/>
+              </a:rPr>
+              <a:t>plan del proyecto</a:t>
+            </a:r>
+            <a:r>
+              <a:rPr lang="es-CO" sz="1800" dirty="0" smtClean="0">
+                <a:latin typeface="Arial" panose="020B0604020202020204" pitchFamily="34" charset="0"/>
+                <a:cs typeface="Arial" panose="020B0604020202020204" pitchFamily="34" charset="0"/>
+              </a:rPr>
+              <a:t>: nos permitió tener un acción para ser ejecutado sobre el proyecto de la empresa San ambiente y adicional, no permitió tener documentado como será ejecutado el proyecto macro y cuales son las fases y pasoso que se debe llevar a cabo para desarrollar de forma secuencia y ordenadas las actividades para dar como resultado final, el producto requerido por la empresa</a:t>
+            </a:r>
+          </a:p>
+          <a:p>
+            <a:pPr marL="0" lvl="0" indent="0">
+              <a:buNone/>
+            </a:pPr>
+            <a:r>
+              <a:rPr lang="es-CO" sz="1800" b="1" dirty="0">
+                <a:latin typeface="Arial" panose="020B0604020202020204" pitchFamily="34" charset="0"/>
+                <a:cs typeface="Arial" panose="020B0604020202020204" pitchFamily="34" charset="0"/>
+              </a:rPr>
+              <a:t>Repositorio del </a:t>
+            </a:r>
+            <a:r>
+              <a:rPr lang="es-CO" sz="1800" b="1" dirty="0" smtClean="0">
+                <a:latin typeface="Arial" panose="020B0604020202020204" pitchFamily="34" charset="0"/>
+                <a:cs typeface="Arial" panose="020B0604020202020204" pitchFamily="34" charset="0"/>
+              </a:rPr>
+              <a:t>proyecto: </a:t>
+            </a:r>
+            <a:r>
+              <a:rPr lang="es-CO" sz="1800" dirty="0" smtClean="0">
+                <a:latin typeface="Arial" panose="020B0604020202020204" pitchFamily="34" charset="0"/>
+                <a:cs typeface="Arial" panose="020B0604020202020204" pitchFamily="34" charset="0"/>
+              </a:rPr>
+              <a:t>este artefacto fue muy crucial ya que en este se subía sus avances del proyecto, para darle dicha revisión y aprobación.</a:t>
+            </a:r>
+          </a:p>
+          <a:p>
+            <a:pPr marL="0" indent="0">
+              <a:buNone/>
+            </a:pPr>
+            <a:r>
+              <a:rPr lang="es-CO" sz="1800" b="1" dirty="0">
+                <a:latin typeface="Arial" panose="020B0604020202020204" pitchFamily="34" charset="0"/>
+                <a:cs typeface="Arial" panose="020B0604020202020204" pitchFamily="34" charset="0"/>
+              </a:rPr>
+              <a:t>Resultados de la </a:t>
+            </a:r>
+            <a:r>
+              <a:rPr lang="es-CO" sz="1800" b="1" dirty="0" smtClean="0">
+                <a:latin typeface="Arial" panose="020B0604020202020204" pitchFamily="34" charset="0"/>
+                <a:cs typeface="Arial" panose="020B0604020202020204" pitchFamily="34" charset="0"/>
+              </a:rPr>
+              <a:t>verificación: </a:t>
+            </a:r>
+            <a:r>
+              <a:rPr lang="es-CO" sz="1800" dirty="0" smtClean="0">
+                <a:latin typeface="Arial" panose="020B0604020202020204" pitchFamily="34" charset="0"/>
+                <a:cs typeface="Arial" panose="020B0604020202020204" pitchFamily="34" charset="0"/>
+              </a:rPr>
+              <a:t>en este formato no tuvo como tal impacto,  alto en el desarrollo del proyecto macro, pero se utilizo como una opción de registro de los cambios necesarios que se acordaban junto con el equipo de trabajo</a:t>
+            </a:r>
+            <a:endParaRPr lang="es-CO" sz="1800" dirty="0">
+              <a:latin typeface="Arial" panose="020B0604020202020204" pitchFamily="34" charset="0"/>
+              <a:cs typeface="Arial" panose="020B0604020202020204" pitchFamily="34" charset="0"/>
+            </a:endParaRPr>
+          </a:p>
+          <a:p>
+            <a:pPr marL="0" indent="0">
+              <a:buNone/>
+            </a:pPr>
+            <a:endParaRPr lang="es-CO" sz="1800" dirty="0" smtClean="0">
+              <a:latin typeface="Arial" panose="020B0604020202020204" pitchFamily="34" charset="0"/>
+              <a:cs typeface="Arial" panose="020B0604020202020204" pitchFamily="34" charset="0"/>
+            </a:endParaRPr>
+          </a:p>
+          <a:p>
+            <a:pPr marL="0" indent="0">
+              <a:buNone/>
+            </a:pPr>
+            <a:endParaRPr lang="es-CO" sz="1800" dirty="0">
               <a:latin typeface="Arial" panose="020B0604020202020204" pitchFamily="34" charset="0"/>
               <a:cs typeface="Arial" panose="020B0604020202020204" pitchFamily="34" charset="0"/>
             </a:endParaRPr>

</xml_diff>